<commit_message>
Added images to patent slides
</commit_message>
<xml_diff>
--- a/Documents/Team G - Intellectual Property in Software.pptx
+++ b/Documents/Team G - Intellectual Property in Software.pptx
@@ -2381,7 +2381,7 @@
         <p:spPr>
           <a:xfrm>
             <a:off x="720" y="720"/>
-            <a:ext cx="10076760" cy="7556760"/>
+            <a:ext cx="10076400" cy="7556400"/>
           </a:xfrm>
           <a:prstGeom prst="rect">
             <a:avLst/>
@@ -2604,7 +2604,7 @@
         <p:spPr>
           <a:xfrm>
             <a:off x="720" y="720"/>
-            <a:ext cx="10076760" cy="7556760"/>
+            <a:ext cx="10076400" cy="7556400"/>
           </a:xfrm>
           <a:prstGeom prst="rect">
             <a:avLst/>
@@ -2814,7 +2814,7 @@
         <p:spPr>
           <a:xfrm>
             <a:off x="504000" y="301320"/>
-            <a:ext cx="9068760" cy="1259280"/>
+            <a:ext cx="9068400" cy="1258920"/>
           </a:xfrm>
           <a:prstGeom prst="rect">
             <a:avLst/>
@@ -2855,7 +2855,7 @@
         <p:spPr>
           <a:xfrm>
             <a:off x="504000" y="1769040"/>
-            <a:ext cx="9068760" cy="4381560"/>
+            <a:ext cx="9068400" cy="4381200"/>
           </a:xfrm>
           <a:prstGeom prst="rect">
             <a:avLst/>
@@ -2958,7 +2958,7 @@
         <p:spPr>
           <a:xfrm>
             <a:off x="1296000" y="1800000"/>
-            <a:ext cx="7319160" cy="3943440"/>
+            <a:ext cx="7318800" cy="3943080"/>
           </a:xfrm>
           <a:prstGeom prst="rect">
             <a:avLst/>
@@ -3019,14 +3019,14 @@
       </p:grpSpPr>
       <p:sp>
         <p:nvSpPr>
-          <p:cNvPr id="93" name="CustomShape 1"/>
+          <p:cNvPr id="95" name="CustomShape 1"/>
           <p:cNvSpPr/>
           <p:nvPr/>
         </p:nvSpPr>
         <p:spPr>
           <a:xfrm>
             <a:off x="504000" y="301320"/>
-            <a:ext cx="9071280" cy="1261440"/>
+            <a:ext cx="9070920" cy="1261080"/>
           </a:xfrm>
           <a:prstGeom prst="rect">
             <a:avLst/>
@@ -3056,14 +3056,14 @@
       </p:sp>
       <p:sp>
         <p:nvSpPr>
-          <p:cNvPr id="94" name="CustomShape 2"/>
+          <p:cNvPr id="96" name="CustomShape 2"/>
           <p:cNvSpPr/>
           <p:nvPr/>
         </p:nvSpPr>
         <p:spPr>
           <a:xfrm>
             <a:off x="504000" y="1768680"/>
-            <a:ext cx="9071280" cy="4383360"/>
+            <a:ext cx="9070920" cy="4383000"/>
           </a:xfrm>
           <a:prstGeom prst="rect">
             <a:avLst/>
@@ -3208,14 +3208,14 @@
       </p:grpSpPr>
       <p:sp>
         <p:nvSpPr>
-          <p:cNvPr id="95" name="CustomShape 1"/>
+          <p:cNvPr id="97" name="CustomShape 1"/>
           <p:cNvSpPr/>
           <p:nvPr/>
         </p:nvSpPr>
         <p:spPr>
           <a:xfrm>
             <a:off x="504000" y="301320"/>
-            <a:ext cx="9071280" cy="1261440"/>
+            <a:ext cx="9070920" cy="1261080"/>
           </a:xfrm>
           <a:prstGeom prst="rect">
             <a:avLst/>
@@ -3245,14 +3245,14 @@
       </p:sp>
       <p:sp>
         <p:nvSpPr>
-          <p:cNvPr id="96" name="CustomShape 2"/>
+          <p:cNvPr id="98" name="CustomShape 2"/>
           <p:cNvSpPr/>
           <p:nvPr/>
         </p:nvSpPr>
         <p:spPr>
           <a:xfrm>
             <a:off x="504000" y="1768680"/>
-            <a:ext cx="9071280" cy="4383360"/>
+            <a:ext cx="9070920" cy="4383000"/>
           </a:xfrm>
           <a:prstGeom prst="rect">
             <a:avLst/>
@@ -3389,14 +3389,14 @@
       </p:grpSpPr>
       <p:sp>
         <p:nvSpPr>
-          <p:cNvPr id="97" name="CustomShape 1"/>
+          <p:cNvPr id="99" name="CustomShape 1"/>
           <p:cNvSpPr/>
           <p:nvPr/>
         </p:nvSpPr>
         <p:spPr>
           <a:xfrm>
             <a:off x="504000" y="301320"/>
-            <a:ext cx="9071280" cy="1261440"/>
+            <a:ext cx="9070920" cy="1261080"/>
           </a:xfrm>
           <a:prstGeom prst="rect">
             <a:avLst/>
@@ -3409,14 +3409,14 @@
       </p:sp>
       <p:sp>
         <p:nvSpPr>
-          <p:cNvPr id="98" name="CustomShape 2"/>
+          <p:cNvPr id="100" name="CustomShape 2"/>
           <p:cNvSpPr/>
           <p:nvPr/>
         </p:nvSpPr>
         <p:spPr>
           <a:xfrm>
             <a:off x="504000" y="1768680"/>
-            <a:ext cx="9071280" cy="4383360"/>
+            <a:ext cx="9070920" cy="4383000"/>
           </a:xfrm>
           <a:prstGeom prst="rect">
             <a:avLst/>
@@ -3519,14 +3519,14 @@
       </p:grpSpPr>
       <p:sp>
         <p:nvSpPr>
-          <p:cNvPr id="99" name="CustomShape 1"/>
+          <p:cNvPr id="101" name="CustomShape 1"/>
           <p:cNvSpPr/>
           <p:nvPr/>
         </p:nvSpPr>
         <p:spPr>
           <a:xfrm>
             <a:off x="504000" y="301320"/>
-            <a:ext cx="9071280" cy="1261440"/>
+            <a:ext cx="9070920" cy="1261080"/>
           </a:xfrm>
           <a:prstGeom prst="rect">
             <a:avLst/>
@@ -3551,14 +3551,14 @@
       </p:sp>
       <p:sp>
         <p:nvSpPr>
-          <p:cNvPr id="100" name="CustomShape 2"/>
+          <p:cNvPr id="102" name="CustomShape 2"/>
           <p:cNvSpPr/>
           <p:nvPr/>
         </p:nvSpPr>
         <p:spPr>
           <a:xfrm>
             <a:off x="504000" y="1768680"/>
-            <a:ext cx="9071280" cy="4383360"/>
+            <a:ext cx="9070920" cy="4383000"/>
           </a:xfrm>
           <a:prstGeom prst="rect">
             <a:avLst/>
@@ -3737,14 +3737,14 @@
       </p:grpSpPr>
       <p:sp>
         <p:nvSpPr>
-          <p:cNvPr id="101" name="CustomShape 1"/>
+          <p:cNvPr id="103" name="CustomShape 1"/>
           <p:cNvSpPr/>
           <p:nvPr/>
         </p:nvSpPr>
         <p:spPr>
           <a:xfrm>
             <a:off x="504000" y="301320"/>
-            <a:ext cx="9071280" cy="1261440"/>
+            <a:ext cx="9070920" cy="1261080"/>
           </a:xfrm>
           <a:prstGeom prst="rect">
             <a:avLst/>
@@ -3769,14 +3769,14 @@
       </p:sp>
       <p:sp>
         <p:nvSpPr>
-          <p:cNvPr id="102" name="CustomShape 2"/>
+          <p:cNvPr id="104" name="CustomShape 2"/>
           <p:cNvSpPr/>
           <p:nvPr/>
         </p:nvSpPr>
         <p:spPr>
           <a:xfrm>
             <a:off x="504000" y="1768680"/>
-            <a:ext cx="9071280" cy="4383360"/>
+            <a:ext cx="9070920" cy="4383000"/>
           </a:xfrm>
           <a:prstGeom prst="rect">
             <a:avLst/>
@@ -4133,7 +4133,7 @@
         <p:spPr>
           <a:xfrm>
             <a:off x="504000" y="301320"/>
-            <a:ext cx="9071280" cy="1261080"/>
+            <a:ext cx="9070920" cy="1260720"/>
           </a:xfrm>
           <a:prstGeom prst="rect">
             <a:avLst/>
@@ -4174,7 +4174,7 @@
         <p:spPr>
           <a:xfrm>
             <a:off x="504000" y="1768680"/>
-            <a:ext cx="9071280" cy="4383360"/>
+            <a:ext cx="9070920" cy="4383000"/>
           </a:xfrm>
           <a:prstGeom prst="rect">
             <a:avLst/>
@@ -4282,7 +4282,7 @@
         <p:spPr>
           <a:xfrm>
             <a:off x="504000" y="301320"/>
-            <a:ext cx="9071280" cy="1261440"/>
+            <a:ext cx="9070920" cy="1261080"/>
           </a:xfrm>
           <a:prstGeom prst="rect">
             <a:avLst/>
@@ -4319,7 +4319,7 @@
         <p:spPr>
           <a:xfrm>
             <a:off x="504000" y="1768680"/>
-            <a:ext cx="9071280" cy="4383360"/>
+            <a:ext cx="9070920" cy="4383000"/>
           </a:xfrm>
           <a:prstGeom prst="rect">
             <a:avLst/>
@@ -4479,7 +4479,7 @@
         <p:spPr>
           <a:xfrm>
             <a:off x="504000" y="301320"/>
-            <a:ext cx="9071280" cy="1261440"/>
+            <a:ext cx="9070920" cy="1261080"/>
           </a:xfrm>
           <a:prstGeom prst="rect">
             <a:avLst/>
@@ -4516,7 +4516,7 @@
         <p:spPr>
           <a:xfrm>
             <a:off x="504000" y="1768680"/>
-            <a:ext cx="9071280" cy="4383360"/>
+            <a:ext cx="9070920" cy="4383000"/>
           </a:xfrm>
           <a:prstGeom prst="rect">
             <a:avLst/>
@@ -4660,7 +4660,7 @@
         <p:spPr>
           <a:xfrm>
             <a:off x="504000" y="301320"/>
-            <a:ext cx="9071280" cy="1261440"/>
+            <a:ext cx="9070920" cy="1261080"/>
           </a:xfrm>
           <a:prstGeom prst="rect">
             <a:avLst/>
@@ -4697,7 +4697,7 @@
         <p:spPr>
           <a:xfrm>
             <a:off x="504000" y="1768680"/>
-            <a:ext cx="9071280" cy="4383360"/>
+            <a:ext cx="9070920" cy="4383000"/>
           </a:xfrm>
           <a:prstGeom prst="rect">
             <a:avLst/>
@@ -4866,7 +4866,7 @@
         <p:spPr>
           <a:xfrm>
             <a:off x="504000" y="301320"/>
-            <a:ext cx="9071280" cy="1261440"/>
+            <a:ext cx="9070920" cy="1261080"/>
           </a:xfrm>
           <a:prstGeom prst="rect">
             <a:avLst/>
@@ -4903,7 +4903,7 @@
         <p:spPr>
           <a:xfrm>
             <a:off x="504000" y="1768680"/>
-            <a:ext cx="9071280" cy="4383360"/>
+            <a:ext cx="9070920" cy="4383000"/>
           </a:xfrm>
           <a:prstGeom prst="rect">
             <a:avLst/>
@@ -5047,7 +5047,7 @@
         <p:spPr>
           <a:xfrm>
             <a:off x="504000" y="301320"/>
-            <a:ext cx="9071280" cy="1261440"/>
+            <a:ext cx="9070920" cy="1261080"/>
           </a:xfrm>
           <a:prstGeom prst="rect">
             <a:avLst/>
@@ -5084,7 +5084,7 @@
         <p:spPr>
           <a:xfrm>
             <a:off x="504000" y="1768680"/>
-            <a:ext cx="9071280" cy="4383360"/>
+            <a:ext cx="9070920" cy="4383000"/>
           </a:xfrm>
           <a:prstGeom prst="rect">
             <a:avLst/>
@@ -5170,6 +5170,56 @@
           </a:p>
         </p:txBody>
       </p:sp>
+      <p:pic>
+        <p:nvPicPr>
+          <p:cNvPr id="89" name="" descr=""/>
+          <p:cNvPicPr/>
+          <p:nvPr/>
+        </p:nvPicPr>
+        <p:blipFill>
+          <a:blip r:embed="rId1"/>
+          <a:stretch>
+            <a:fillRect/>
+          </a:stretch>
+        </p:blipFill>
+        <p:spPr>
+          <a:xfrm>
+            <a:off x="432000" y="4477320"/>
+            <a:ext cx="4837680" cy="2506680"/>
+          </a:xfrm>
+          <a:prstGeom prst="rect">
+            <a:avLst/>
+          </a:prstGeom>
+          <a:ln>
+            <a:noFill/>
+          </a:ln>
+        </p:spPr>
+      </p:pic>
+      <p:pic>
+        <p:nvPicPr>
+          <p:cNvPr id="90" name="" descr=""/>
+          <p:cNvPicPr/>
+          <p:nvPr/>
+        </p:nvPicPr>
+        <p:blipFill>
+          <a:blip r:embed="rId2"/>
+          <a:stretch>
+            <a:fillRect/>
+          </a:stretch>
+        </p:blipFill>
+        <p:spPr>
+          <a:xfrm>
+            <a:off x="5849280" y="4680000"/>
+            <a:ext cx="2286720" cy="2304000"/>
+          </a:xfrm>
+          <a:prstGeom prst="rect">
+            <a:avLst/>
+          </a:prstGeom>
+          <a:ln>
+            <a:noFill/>
+          </a:ln>
+        </p:spPr>
+      </p:pic>
     </p:spTree>
   </p:cSld>
   <p:timing>
@@ -5221,14 +5271,14 @@
       </p:grpSpPr>
       <p:sp>
         <p:nvSpPr>
-          <p:cNvPr id="89" name="CustomShape 1"/>
+          <p:cNvPr id="91" name="CustomShape 1"/>
           <p:cNvSpPr/>
           <p:nvPr/>
         </p:nvSpPr>
         <p:spPr>
           <a:xfrm>
             <a:off x="504000" y="301320"/>
-            <a:ext cx="9071280" cy="1261440"/>
+            <a:ext cx="9070920" cy="1261080"/>
           </a:xfrm>
           <a:prstGeom prst="rect">
             <a:avLst/>
@@ -5258,14 +5308,14 @@
       </p:sp>
       <p:sp>
         <p:nvSpPr>
-          <p:cNvPr id="90" name="CustomShape 2"/>
+          <p:cNvPr id="92" name="CustomShape 2"/>
           <p:cNvSpPr/>
           <p:nvPr/>
         </p:nvSpPr>
         <p:spPr>
           <a:xfrm>
             <a:off x="504000" y="1768680"/>
-            <a:ext cx="9071280" cy="4383360"/>
+            <a:ext cx="9070920" cy="4383000"/>
           </a:xfrm>
           <a:prstGeom prst="rect">
             <a:avLst/>
@@ -5402,14 +5452,14 @@
       </p:grpSpPr>
       <p:sp>
         <p:nvSpPr>
-          <p:cNvPr id="91" name="CustomShape 1"/>
+          <p:cNvPr id="93" name="CustomShape 1"/>
           <p:cNvSpPr/>
           <p:nvPr/>
         </p:nvSpPr>
         <p:spPr>
           <a:xfrm>
             <a:off x="504000" y="301320"/>
-            <a:ext cx="9071280" cy="1261440"/>
+            <a:ext cx="9070920" cy="1261080"/>
           </a:xfrm>
           <a:prstGeom prst="rect">
             <a:avLst/>
@@ -5439,14 +5489,14 @@
       </p:sp>
       <p:sp>
         <p:nvSpPr>
-          <p:cNvPr id="92" name="CustomShape 2"/>
+          <p:cNvPr id="94" name="CustomShape 2"/>
           <p:cNvSpPr/>
           <p:nvPr/>
         </p:nvSpPr>
         <p:spPr>
           <a:xfrm>
             <a:off x="504000" y="1768680"/>
-            <a:ext cx="9071280" cy="4383360"/>
+            <a:ext cx="9070920" cy="4383000"/>
           </a:xfrm>
           <a:prstGeom prst="rect">
             <a:avLst/>

</xml_diff>

<commit_message>
Added one more slide for patents
</commit_message>
<xml_diff>
--- a/Documents/Team G - Intellectual Property in Software.pptx
+++ b/Documents/Team G - Intellectual Property in Software.pptx
@@ -20,6 +20,7 @@
     <p:sldId id="266" r:id="rId15"/>
     <p:sldId id="267" r:id="rId16"/>
     <p:sldId id="268" r:id="rId17"/>
+    <p:sldId id="269" r:id="rId18"/>
   </p:sldIdLst>
   <p:sldSz cx="10080625" cy="7559675"/>
   <p:notesSz cx="7559675" cy="10691812"/>
@@ -3539,7 +3540,7 @@
         <p:spPr>
           <a:xfrm>
             <a:off x="720" y="720"/>
-            <a:ext cx="10075680" cy="7555680"/>
+            <a:ext cx="10075320" cy="7555320"/>
           </a:xfrm>
           <a:prstGeom prst="rect">
             <a:avLst/>
@@ -3762,7 +3763,7 @@
         <p:spPr>
           <a:xfrm>
             <a:off x="720" y="720"/>
-            <a:ext cx="10075680" cy="7555680"/>
+            <a:ext cx="10075320" cy="7555320"/>
           </a:xfrm>
           <a:prstGeom prst="rect">
             <a:avLst/>
@@ -3985,7 +3986,7 @@
         <p:spPr>
           <a:xfrm>
             <a:off x="720" y="720"/>
-            <a:ext cx="10075680" cy="7555680"/>
+            <a:ext cx="10075320" cy="7555320"/>
           </a:xfrm>
           <a:prstGeom prst="rect">
             <a:avLst/>
@@ -4040,7 +4041,7 @@
         <p:spPr>
           <a:xfrm>
             <a:off x="504000" y="1768680"/>
-            <a:ext cx="9072000" cy="4384080"/>
+            <a:ext cx="9071640" cy="4383720"/>
           </a:xfrm>
           <a:prstGeom prst="rect">
             <a:avLst/>
@@ -4055,7 +4056,7 @@
               <a:buChar char=""/>
             </a:pPr>
             <a:r>
-              <a:rPr lang="en-IE" sz="3200">
+              <a:rPr lang="en-IE">
                 <a:latin typeface="Arial"/>
               </a:rPr>
               <a:t>Click to edit the outline text format</a:t>
@@ -4069,7 +4070,7 @@
               <a:buChar char=""/>
             </a:pPr>
             <a:r>
-              <a:rPr lang="en-IE" sz="2800">
+              <a:rPr lang="en-IE">
                 <a:latin typeface="Arial"/>
               </a:rPr>
               <a:t>Second Outline Level</a:t>
@@ -4083,7 +4084,7 @@
               <a:buChar char=""/>
             </a:pPr>
             <a:r>
-              <a:rPr lang="en-IE" sz="2400">
+              <a:rPr lang="en-IE">
                 <a:latin typeface="Arial"/>
               </a:rPr>
               <a:t>Third Outline Level</a:t>
@@ -4097,7 +4098,7 @@
               <a:buChar char=""/>
             </a:pPr>
             <a:r>
-              <a:rPr lang="en-IE" sz="2000">
+              <a:rPr lang="en-IE">
                 <a:latin typeface="Arial"/>
               </a:rPr>
               <a:t>Fourth Outline Level</a:t>
@@ -4111,7 +4112,7 @@
               <a:buChar char=""/>
             </a:pPr>
             <a:r>
-              <a:rPr lang="en-IE" sz="2000">
+              <a:rPr lang="en-IE">
                 <a:latin typeface="Arial"/>
               </a:rPr>
               <a:t>Fifth Outline Level</a:t>
@@ -4125,7 +4126,7 @@
               <a:buChar char=""/>
             </a:pPr>
             <a:r>
-              <a:rPr lang="en-IE" sz="2000">
+              <a:rPr lang="en-IE">
                 <a:latin typeface="Arial"/>
               </a:rPr>
               <a:t>Sixth Outline Level</a:t>
@@ -4139,7 +4140,7 @@
               <a:buChar char=""/>
             </a:pPr>
             <a:r>
-              <a:rPr lang="en-IE" sz="2000">
+              <a:rPr lang="en-IE">
                 <a:latin typeface="Arial"/>
               </a:rPr>
               <a:t>Seventh Outline Level</a:t>
@@ -4194,7 +4195,7 @@
         <p:spPr>
           <a:xfrm>
             <a:off x="504000" y="301320"/>
-            <a:ext cx="9067680" cy="1258200"/>
+            <a:ext cx="9067320" cy="1257840"/>
           </a:xfrm>
           <a:prstGeom prst="rect">
             <a:avLst/>
@@ -4235,7 +4236,7 @@
         <p:spPr>
           <a:xfrm>
             <a:off x="504000" y="1769040"/>
-            <a:ext cx="9067680" cy="4380480"/>
+            <a:ext cx="9067320" cy="4380120"/>
           </a:xfrm>
           <a:prstGeom prst="rect">
             <a:avLst/>
@@ -4338,7 +4339,7 @@
         <p:spPr>
           <a:xfrm>
             <a:off x="1296000" y="1800000"/>
-            <a:ext cx="7318080" cy="3942360"/>
+            <a:ext cx="7317720" cy="3942000"/>
           </a:xfrm>
           <a:prstGeom prst="rect">
             <a:avLst/>
@@ -4413,7 +4414,7 @@
         <p:spPr>
           <a:xfrm>
             <a:off x="504360" y="301320"/>
-            <a:ext cx="9071280" cy="1261800"/>
+            <a:ext cx="9070920" cy="1261440"/>
           </a:xfrm>
           <a:prstGeom prst="rect">
             <a:avLst/>
@@ -4437,9 +4438,15 @@
             <a:r>
               <a:rPr lang="en-IE" sz="4400">
                 <a:latin typeface="Arial"/>
+              </a:rPr>
+              <a:t>C</a:t>
+            </a:r>
+            <a:r>
+              <a:rPr lang="en-IE" sz="4400">
+                <a:latin typeface="Arial"/>
                 <a:ea typeface="宋体"/>
               </a:rPr>
-              <a:t>Copyright</a:t>
+              <a:t>opyright</a:t>
             </a:r>
             <a:endParaRPr/>
           </a:p>
@@ -4453,8 +4460,8 @@
         </p:nvSpPr>
         <p:spPr>
           <a:xfrm>
-            <a:off x="720360" y="1978920"/>
-            <a:ext cx="8712720" cy="4174200"/>
+            <a:off x="791640" y="1907640"/>
+            <a:ext cx="8496360" cy="3096720"/>
           </a:xfrm>
           <a:prstGeom prst="rect">
             <a:avLst/>
@@ -4477,2192 +4484,6 @@
                 <a:latin typeface="Arial"/>
                 <a:ea typeface="宋体"/>
               </a:rPr>
-              <a:t>Features of copyright :</a:t>
-            </a:r>
-            <a:endParaRPr/>
-          </a:p>
-          <a:p>
-            <a:pPr>
-              <a:lnSpc>
-                <a:spcPct val="100000"/>
-              </a:lnSpc>
-            </a:pPr>
-            <a:endParaRPr/>
-          </a:p>
-          <a:p>
-            <a:pPr>
-              <a:lnSpc>
-                <a:spcPct val="100000"/>
-              </a:lnSpc>
-              <a:buSzPct val="25000"/>
-              <a:buFont typeface="Wingdings" charset="2"/>
-              <a:buChar char=""/>
-            </a:pPr>
-            <a:r>
-              <a:rPr lang="en-IE" sz="3200">
-                <a:latin typeface="Arial"/>
-                <a:ea typeface="宋体"/>
-              </a:rPr>
-              <a:t>Made upon creation</a:t>
-            </a:r>
-            <a:endParaRPr/>
-          </a:p>
-          <a:p>
-            <a:pPr>
-              <a:lnSpc>
-                <a:spcPct val="100000"/>
-              </a:lnSpc>
-            </a:pPr>
-            <a:endParaRPr/>
-          </a:p>
-          <a:p>
-            <a:pPr>
-              <a:lnSpc>
-                <a:spcPct val="100000"/>
-              </a:lnSpc>
-            </a:pPr>
-            <a:r>
-              <a:rPr lang="en-IE" sz="3200">
-                <a:latin typeface="Arial"/>
-                <a:ea typeface="宋体"/>
-              </a:rPr>
-              <a:t>    </a:t>
-            </a:r>
-            <a:r>
-              <a:rPr lang="en-IE" sz="3200">
-                <a:latin typeface="Arial"/>
-                <a:ea typeface="宋体"/>
-              </a:rPr>
-              <a:t>Applying is unnecessary</a:t>
-            </a:r>
-            <a:endParaRPr/>
-          </a:p>
-          <a:p>
-            <a:pPr>
-              <a:lnSpc>
-                <a:spcPct val="100000"/>
-              </a:lnSpc>
-            </a:pPr>
-            <a:endParaRPr/>
-          </a:p>
-          <a:p>
-            <a:pPr>
-              <a:lnSpc>
-                <a:spcPct val="100000"/>
-              </a:lnSpc>
-              <a:buSzPct val="25000"/>
-              <a:buFont typeface="Wingdings" charset="2"/>
-              <a:buChar char=""/>
-            </a:pPr>
-            <a:r>
-              <a:rPr lang="en-IE" sz="3200">
-                <a:latin typeface="Arial"/>
-                <a:ea typeface="宋体"/>
-              </a:rPr>
-              <a:t>Copyright protection is lifelong</a:t>
-            </a:r>
-            <a:endParaRPr/>
-          </a:p>
-        </p:txBody>
-      </p:sp>
-    </p:spTree>
-  </p:cSld>
-  <p:timing>
-    <p:tnLst>
-      <p:par>
-        <p:cTn id="19" dur="indefinite" restart="never" nodeType="tmRoot">
-          <p:childTnLst>
-            <p:seq>
-              <p:cTn id="20" nodeType="mainSeq"/>
-              <p:prevCondLst>
-                <p:cond delay="0" evt="onPrev">
-                  <p:tgtEl>
-                    <p:sldTgt/>
-                  </p:tgtEl>
-                </p:cond>
-              </p:prevCondLst>
-              <p:nextCondLst>
-                <p:cond delay="0" evt="onNext">
-                  <p:tgtEl>
-                    <p:sldTgt/>
-                  </p:tgtEl>
-                </p:cond>
-              </p:nextCondLst>
-            </p:seq>
-          </p:childTnLst>
-        </p:cTn>
-      </p:par>
-    </p:tnLst>
-  </p:timing>
-</p:sld>
-</file>
-
-<file path=ppt/slides/slide11.xml><?xml version="1.0" encoding="utf-8"?>
-<p:sld xmlns:a="http://schemas.openxmlformats.org/drawingml/2006/main" xmlns:p="http://schemas.openxmlformats.org/presentationml/2006/main" xmlns:r="http://schemas.openxmlformats.org/officeDocument/2006/relationships">
-  <p:cSld>
-    <p:spTree>
-      <p:nvGrpSpPr>
-        <p:cNvPr id="1" name=""/>
-        <p:cNvGrpSpPr/>
-        <p:nvPr/>
-      </p:nvGrpSpPr>
-      <p:grpSpPr>
-        <a:xfrm>
-          <a:off x="0" y="0"/>
-          <a:ext cx="0" cy="0"/>
-          <a:chOff x="0" y="0"/>
-          <a:chExt cx="0" cy="0"/>
-        </a:xfrm>
-      </p:grpSpPr>
-      <p:sp>
-        <p:nvSpPr>
-          <p:cNvPr id="137" name="CustomShape 1"/>
-          <p:cNvSpPr/>
-          <p:nvPr/>
-        </p:nvSpPr>
-        <p:spPr>
-          <a:xfrm>
-            <a:off x="504000" y="301320"/>
-            <a:ext cx="9070200" cy="1260360"/>
-          </a:xfrm>
-          <a:prstGeom prst="rect">
-            <a:avLst/>
-          </a:prstGeom>
-          <a:noFill/>
-          <a:ln>
-            <a:noFill/>
-          </a:ln>
-        </p:spPr>
-        <p:txBody>
-          <a:bodyPr lIns="0" rIns="0" tIns="0" bIns="0" anchor="ctr"/>
-          <a:p>
-            <a:pPr algn="ctr">
-              <a:lnSpc>
-                <a:spcPct val="100000"/>
-              </a:lnSpc>
-            </a:pPr>
-            <a:r>
-              <a:rPr lang="en-IE" sz="4400">
-                <a:latin typeface="Arial"/>
-              </a:rPr>
-              <a:t>Trade Secret</a:t>
-            </a:r>
-            <a:endParaRPr/>
-          </a:p>
-        </p:txBody>
-      </p:sp>
-      <p:sp>
-        <p:nvSpPr>
-          <p:cNvPr id="138" name="CustomShape 2"/>
-          <p:cNvSpPr/>
-          <p:nvPr/>
-        </p:nvSpPr>
-        <p:spPr>
-          <a:xfrm>
-            <a:off x="504000" y="1768680"/>
-            <a:ext cx="9070200" cy="4382280"/>
-          </a:xfrm>
-          <a:prstGeom prst="rect">
-            <a:avLst/>
-          </a:prstGeom>
-          <a:noFill/>
-          <a:ln>
-            <a:noFill/>
-          </a:ln>
-        </p:spPr>
-        <p:txBody>
-          <a:bodyPr lIns="0" rIns="0" tIns="0" bIns="0"/>
-          <a:p>
-            <a:pPr>
-              <a:lnSpc>
-                <a:spcPct val="100000"/>
-              </a:lnSpc>
-            </a:pPr>
-            <a:endParaRPr/>
-          </a:p>
-          <a:p>
-            <a:pPr>
-              <a:lnSpc>
-                <a:spcPct val="100000"/>
-              </a:lnSpc>
-              <a:buFont typeface="Wingdings" charset="2"/>
-              <a:buChar char=""/>
-            </a:pPr>
-            <a:r>
-              <a:rPr lang="en-IE" sz="3200">
-                <a:latin typeface="Arial"/>
-              </a:rPr>
-              <a:t>Any formula, pattern, process, tool or mechanism</a:t>
-            </a:r>
-            <a:endParaRPr/>
-          </a:p>
-          <a:p>
-            <a:pPr>
-              <a:lnSpc>
-                <a:spcPct val="100000"/>
-              </a:lnSpc>
-            </a:pPr>
-            <a:endParaRPr/>
-          </a:p>
-          <a:p>
-            <a:pPr>
-              <a:lnSpc>
-                <a:spcPct val="100000"/>
-              </a:lnSpc>
-              <a:buFont typeface="Wingdings" charset="2"/>
-              <a:buChar char=""/>
-            </a:pPr>
-            <a:r>
-              <a:rPr lang="en-IE" sz="3200">
-                <a:latin typeface="Arial"/>
-              </a:rPr>
-              <a:t>Theoretically lasts forever</a:t>
-            </a:r>
-            <a:endParaRPr/>
-          </a:p>
-          <a:p>
-            <a:pPr>
-              <a:lnSpc>
-                <a:spcPct val="100000"/>
-              </a:lnSpc>
-            </a:pPr>
-            <a:endParaRPr/>
-          </a:p>
-          <a:p>
-            <a:pPr>
-              <a:lnSpc>
-                <a:spcPct val="100000"/>
-              </a:lnSpc>
-              <a:buFont typeface="Wingdings" charset="2"/>
-              <a:buChar char=""/>
-            </a:pPr>
-            <a:r>
-              <a:rPr lang="en-IE" sz="3200">
-                <a:latin typeface="Arial"/>
-              </a:rPr>
-              <a:t>Subject to theft and not “infringement”</a:t>
-            </a:r>
-            <a:endParaRPr/>
-          </a:p>
-          <a:p>
-            <a:pPr>
-              <a:lnSpc>
-                <a:spcPct val="100000"/>
-              </a:lnSpc>
-            </a:pPr>
-            <a:endParaRPr/>
-          </a:p>
-        </p:txBody>
-      </p:sp>
-    </p:spTree>
-  </p:cSld>
-  <p:timing>
-    <p:tnLst>
-      <p:par>
-        <p:cTn id="21" dur="indefinite" restart="never" nodeType="tmRoot">
-          <p:childTnLst>
-            <p:seq>
-              <p:cTn id="22" nodeType="mainSeq"/>
-              <p:prevCondLst>
-                <p:cond delay="0" evt="onPrev">
-                  <p:tgtEl>
-                    <p:sldTgt/>
-                  </p:tgtEl>
-                </p:cond>
-              </p:prevCondLst>
-              <p:nextCondLst>
-                <p:cond delay="0" evt="onNext">
-                  <p:tgtEl>
-                    <p:sldTgt/>
-                  </p:tgtEl>
-                </p:cond>
-              </p:nextCondLst>
-            </p:seq>
-          </p:childTnLst>
-        </p:cTn>
-      </p:par>
-    </p:tnLst>
-  </p:timing>
-</p:sld>
-</file>
-
-<file path=ppt/slides/slide12.xml><?xml version="1.0" encoding="utf-8"?>
-<p:sld xmlns:a="http://schemas.openxmlformats.org/drawingml/2006/main" xmlns:p="http://schemas.openxmlformats.org/presentationml/2006/main" xmlns:r="http://schemas.openxmlformats.org/officeDocument/2006/relationships">
-  <p:cSld>
-    <p:spTree>
-      <p:nvGrpSpPr>
-        <p:cNvPr id="1" name=""/>
-        <p:cNvGrpSpPr/>
-        <p:nvPr/>
-      </p:nvGrpSpPr>
-      <p:grpSpPr>
-        <a:xfrm>
-          <a:off x="0" y="0"/>
-          <a:ext cx="0" cy="0"/>
-          <a:chOff x="0" y="0"/>
-          <a:chExt cx="0" cy="0"/>
-        </a:xfrm>
-      </p:grpSpPr>
-      <p:sp>
-        <p:nvSpPr>
-          <p:cNvPr id="139" name="CustomShape 1"/>
-          <p:cNvSpPr/>
-          <p:nvPr/>
-        </p:nvSpPr>
-        <p:spPr>
-          <a:xfrm>
-            <a:off x="504000" y="301320"/>
-            <a:ext cx="9070200" cy="1260360"/>
-          </a:xfrm>
-          <a:prstGeom prst="rect">
-            <a:avLst/>
-          </a:prstGeom>
-          <a:noFill/>
-          <a:ln>
-            <a:noFill/>
-          </a:ln>
-        </p:spPr>
-        <p:txBody>
-          <a:bodyPr lIns="0" rIns="0" tIns="0" bIns="0" anchor="ctr"/>
-          <a:p>
-            <a:pPr algn="ctr">
-              <a:lnSpc>
-                <a:spcPct val="100000"/>
-              </a:lnSpc>
-            </a:pPr>
-            <a:r>
-              <a:rPr lang="en-IE" sz="4400">
-                <a:latin typeface="Arial"/>
-              </a:rPr>
-              <a:t>Conclusion</a:t>
-            </a:r>
-            <a:endParaRPr/>
-          </a:p>
-        </p:txBody>
-      </p:sp>
-      <p:sp>
-        <p:nvSpPr>
-          <p:cNvPr id="140" name="CustomShape 2"/>
-          <p:cNvSpPr/>
-          <p:nvPr/>
-        </p:nvSpPr>
-        <p:spPr>
-          <a:xfrm>
-            <a:off x="504000" y="1768680"/>
-            <a:ext cx="9070200" cy="4382280"/>
-          </a:xfrm>
-          <a:prstGeom prst="rect">
-            <a:avLst/>
-          </a:prstGeom>
-          <a:noFill/>
-          <a:ln>
-            <a:noFill/>
-          </a:ln>
-        </p:spPr>
-        <p:txBody>
-          <a:bodyPr lIns="0" rIns="0" tIns="0" bIns="0"/>
-          <a:p>
-            <a:pPr>
-              <a:lnSpc>
-                <a:spcPct val="100000"/>
-              </a:lnSpc>
-            </a:pPr>
-            <a:endParaRPr/>
-          </a:p>
-          <a:p>
-            <a:pPr>
-              <a:lnSpc>
-                <a:spcPct val="100000"/>
-              </a:lnSpc>
-              <a:buFont typeface="Wingdings" charset="2"/>
-              <a:buChar char=""/>
-            </a:pPr>
-            <a:r>
-              <a:rPr lang="en-IE" sz="3200">
-                <a:latin typeface="Arial"/>
-              </a:rPr>
-              <a:t>Intellectual properties are important!</a:t>
-            </a:r>
-            <a:endParaRPr/>
-          </a:p>
-          <a:p>
-            <a:pPr>
-              <a:lnSpc>
-                <a:spcPct val="100000"/>
-              </a:lnSpc>
-            </a:pPr>
-            <a:endParaRPr/>
-          </a:p>
-          <a:p>
-            <a:pPr>
-              <a:lnSpc>
-                <a:spcPct val="100000"/>
-              </a:lnSpc>
-              <a:buFont typeface="Wingdings" charset="2"/>
-              <a:buChar char=""/>
-            </a:pPr>
-            <a:r>
-              <a:rPr lang="en-IE" sz="3200">
-                <a:latin typeface="Arial"/>
-              </a:rPr>
-              <a:t>Take caution with your projects!</a:t>
-            </a:r>
-            <a:endParaRPr/>
-          </a:p>
-          <a:p>
-            <a:pPr>
-              <a:lnSpc>
-                <a:spcPct val="100000"/>
-              </a:lnSpc>
-            </a:pPr>
-            <a:endParaRPr/>
-          </a:p>
-          <a:p>
-            <a:pPr>
-              <a:lnSpc>
-                <a:spcPct val="100000"/>
-              </a:lnSpc>
-              <a:buFont typeface="Wingdings" charset="2"/>
-              <a:buChar char=""/>
-            </a:pPr>
-            <a:r>
-              <a:rPr lang="en-IE" sz="3200">
-                <a:latin typeface="Arial"/>
-              </a:rPr>
-              <a:t>Protect your hard work!</a:t>
-            </a:r>
-            <a:endParaRPr/>
-          </a:p>
-        </p:txBody>
-      </p:sp>
-    </p:spTree>
-  </p:cSld>
-  <p:timing>
-    <p:tnLst>
-      <p:par>
-        <p:cTn id="23" dur="indefinite" restart="never" nodeType="tmRoot">
-          <p:childTnLst>
-            <p:seq>
-              <p:cTn id="24" nodeType="mainSeq"/>
-              <p:prevCondLst>
-                <p:cond delay="0" evt="onPrev">
-                  <p:tgtEl>
-                    <p:sldTgt/>
-                  </p:tgtEl>
-                </p:cond>
-              </p:prevCondLst>
-              <p:nextCondLst>
-                <p:cond delay="0" evt="onNext">
-                  <p:tgtEl>
-                    <p:sldTgt/>
-                  </p:tgtEl>
-                </p:cond>
-              </p:nextCondLst>
-            </p:seq>
-          </p:childTnLst>
-        </p:cTn>
-      </p:par>
-    </p:tnLst>
-  </p:timing>
-</p:sld>
-</file>
-
-<file path=ppt/slides/slide13.xml><?xml version="1.0" encoding="utf-8"?>
-<p:sld xmlns:a="http://schemas.openxmlformats.org/drawingml/2006/main" xmlns:p="http://schemas.openxmlformats.org/presentationml/2006/main" xmlns:r="http://schemas.openxmlformats.org/officeDocument/2006/relationships">
-  <p:cSld>
-    <p:spTree>
-      <p:nvGrpSpPr>
-        <p:cNvPr id="1" name=""/>
-        <p:cNvGrpSpPr/>
-        <p:nvPr/>
-      </p:nvGrpSpPr>
-      <p:grpSpPr>
-        <a:xfrm>
-          <a:off x="0" y="0"/>
-          <a:ext cx="0" cy="0"/>
-          <a:chOff x="0" y="0"/>
-          <a:chExt cx="0" cy="0"/>
-        </a:xfrm>
-      </p:grpSpPr>
-      <p:sp>
-        <p:nvSpPr>
-          <p:cNvPr id="141" name="CustomShape 1"/>
-          <p:cNvSpPr/>
-          <p:nvPr/>
-        </p:nvSpPr>
-        <p:spPr>
-          <a:xfrm>
-            <a:off x="504000" y="301320"/>
-            <a:ext cx="9070200" cy="1260360"/>
-          </a:xfrm>
-          <a:prstGeom prst="rect">
-            <a:avLst/>
-          </a:prstGeom>
-          <a:noFill/>
-          <a:ln>
-            <a:noFill/>
-          </a:ln>
-        </p:spPr>
-      </p:sp>
-      <p:sp>
-        <p:nvSpPr>
-          <p:cNvPr id="142" name="CustomShape 2"/>
-          <p:cNvSpPr/>
-          <p:nvPr/>
-        </p:nvSpPr>
-        <p:spPr>
-          <a:xfrm>
-            <a:off x="504000" y="1768680"/>
-            <a:ext cx="9070200" cy="4382280"/>
-          </a:xfrm>
-          <a:prstGeom prst="rect">
-            <a:avLst/>
-          </a:prstGeom>
-          <a:noFill/>
-          <a:ln>
-            <a:noFill/>
-          </a:ln>
-        </p:spPr>
-        <p:txBody>
-          <a:bodyPr lIns="0" rIns="0" tIns="0" bIns="0"/>
-          <a:p>
-            <a:pPr algn="ctr">
-              <a:lnSpc>
-                <a:spcPct val="100000"/>
-              </a:lnSpc>
-            </a:pPr>
-            <a:endParaRPr/>
-          </a:p>
-          <a:p>
-            <a:pPr algn="ctr">
-              <a:lnSpc>
-                <a:spcPct val="100000"/>
-              </a:lnSpc>
-            </a:pPr>
-            <a:endParaRPr/>
-          </a:p>
-          <a:p>
-            <a:pPr algn="ctr">
-              <a:lnSpc>
-                <a:spcPct val="100000"/>
-              </a:lnSpc>
-            </a:pPr>
-            <a:endParaRPr/>
-          </a:p>
-          <a:p>
-            <a:pPr algn="ctr">
-              <a:lnSpc>
-                <a:spcPct val="100000"/>
-              </a:lnSpc>
-            </a:pPr>
-            <a:r>
-              <a:rPr lang="en-IE" sz="4400">
-                <a:latin typeface="Arial"/>
-              </a:rPr>
-              <a:t>Questions?</a:t>
-            </a:r>
-            <a:endParaRPr/>
-          </a:p>
-        </p:txBody>
-      </p:sp>
-    </p:spTree>
-  </p:cSld>
-  <p:timing>
-    <p:tnLst>
-      <p:par>
-        <p:cTn id="25" dur="indefinite" restart="never" nodeType="tmRoot">
-          <p:childTnLst>
-            <p:seq>
-              <p:cTn id="26" nodeType="mainSeq"/>
-              <p:prevCondLst>
-                <p:cond delay="0" evt="onPrev">
-                  <p:tgtEl>
-                    <p:sldTgt/>
-                  </p:tgtEl>
-                </p:cond>
-              </p:prevCondLst>
-              <p:nextCondLst>
-                <p:cond delay="0" evt="onNext">
-                  <p:tgtEl>
-                    <p:sldTgt/>
-                  </p:tgtEl>
-                </p:cond>
-              </p:nextCondLst>
-            </p:seq>
-          </p:childTnLst>
-        </p:cTn>
-      </p:par>
-    </p:tnLst>
-  </p:timing>
-</p:sld>
-</file>
-
-<file path=ppt/slides/slide2.xml><?xml version="1.0" encoding="utf-8"?>
-<p:sld xmlns:a="http://schemas.openxmlformats.org/drawingml/2006/main" xmlns:p="http://schemas.openxmlformats.org/presentationml/2006/main" xmlns:r="http://schemas.openxmlformats.org/officeDocument/2006/relationships">
-  <p:cSld>
-    <p:spTree>
-      <p:nvGrpSpPr>
-        <p:cNvPr id="1" name=""/>
-        <p:cNvGrpSpPr/>
-        <p:nvPr/>
-      </p:nvGrpSpPr>
-      <p:grpSpPr>
-        <a:xfrm>
-          <a:off x="0" y="0"/>
-          <a:ext cx="0" cy="0"/>
-          <a:chOff x="0" y="0"/>
-          <a:chExt cx="0" cy="0"/>
-        </a:xfrm>
-      </p:grpSpPr>
-      <p:sp>
-        <p:nvSpPr>
-          <p:cNvPr id="114" name="CustomShape 1"/>
-          <p:cNvSpPr/>
-          <p:nvPr/>
-        </p:nvSpPr>
-        <p:spPr>
-          <a:xfrm>
-            <a:off x="504000" y="301320"/>
-            <a:ext cx="9070200" cy="1260000"/>
-          </a:xfrm>
-          <a:prstGeom prst="rect">
-            <a:avLst/>
-          </a:prstGeom>
-          <a:noFill/>
-          <a:ln>
-            <a:noFill/>
-          </a:ln>
-        </p:spPr>
-        <p:txBody>
-          <a:bodyPr lIns="0" rIns="0" tIns="0" bIns="0" anchor="ctr"/>
-          <a:p>
-            <a:pPr algn="ctr">
-              <a:lnSpc>
-                <a:spcPct val="100000"/>
-              </a:lnSpc>
-            </a:pPr>
-            <a:r>
-              <a:rPr lang="en-IE" sz="4400">
-                <a:solidFill>
-                  <a:srgbClr val="000000"/>
-                </a:solidFill>
-                <a:latin typeface="Arial"/>
-                <a:ea typeface="DejaVu Sans"/>
-              </a:rPr>
-              <a:t> </a:t>
-            </a:r>
-            <a:endParaRPr/>
-          </a:p>
-        </p:txBody>
-      </p:sp>
-      <p:sp>
-        <p:nvSpPr>
-          <p:cNvPr id="115" name="CustomShape 2"/>
-          <p:cNvSpPr/>
-          <p:nvPr/>
-        </p:nvSpPr>
-        <p:spPr>
-          <a:xfrm>
-            <a:off x="504000" y="1768680"/>
-            <a:ext cx="9070200" cy="4382280"/>
-          </a:xfrm>
-          <a:prstGeom prst="rect">
-            <a:avLst/>
-          </a:prstGeom>
-          <a:noFill/>
-          <a:ln>
-            <a:noFill/>
-          </a:ln>
-        </p:spPr>
-        <p:txBody>
-          <a:bodyPr lIns="0" rIns="0" tIns="0" bIns="0"/>
-          <a:p>
-            <a:pPr algn="ctr">
-              <a:lnSpc>
-                <a:spcPct val="100000"/>
-              </a:lnSpc>
-            </a:pPr>
-            <a:r>
-              <a:rPr lang="en-IE" sz="5400">
-                <a:solidFill>
-                  <a:srgbClr val="000000"/>
-                </a:solidFill>
-                <a:latin typeface="Arial"/>
-                <a:ea typeface="DejaVu Sans"/>
-              </a:rPr>
-              <a:t>Intellectual Properties </a:t>
-            </a:r>
-            <a:endParaRPr/>
-          </a:p>
-          <a:p>
-            <a:pPr algn="ctr">
-              <a:lnSpc>
-                <a:spcPct val="100000"/>
-              </a:lnSpc>
-            </a:pPr>
-            <a:r>
-              <a:rPr lang="en-IE" sz="5400">
-                <a:solidFill>
-                  <a:srgbClr val="000000"/>
-                </a:solidFill>
-                <a:latin typeface="Arial"/>
-                <a:ea typeface="DejaVu Sans"/>
-              </a:rPr>
-              <a:t>Found in a Software Application</a:t>
-            </a:r>
-            <a:endParaRPr/>
-          </a:p>
-        </p:txBody>
-      </p:sp>
-    </p:spTree>
-  </p:cSld>
-  <p:timing>
-    <p:tnLst>
-      <p:par>
-        <p:cTn id="3" dur="indefinite" restart="never" nodeType="tmRoot">
-          <p:childTnLst>
-            <p:seq>
-              <p:cTn id="4" nodeType="mainSeq"/>
-              <p:prevCondLst>
-                <p:cond delay="0" evt="onPrev">
-                  <p:tgtEl>
-                    <p:sldTgt/>
-                  </p:tgtEl>
-                </p:cond>
-              </p:prevCondLst>
-              <p:nextCondLst>
-                <p:cond delay="0" evt="onNext">
-                  <p:tgtEl>
-                    <p:sldTgt/>
-                  </p:tgtEl>
-                </p:cond>
-              </p:nextCondLst>
-            </p:seq>
-          </p:childTnLst>
-        </p:cTn>
-      </p:par>
-    </p:tnLst>
-  </p:timing>
-</p:sld>
-</file>
-
-<file path=ppt/slides/slide3.xml><?xml version="1.0" encoding="utf-8"?>
-<p:sld xmlns:a="http://schemas.openxmlformats.org/drawingml/2006/main" xmlns:p="http://schemas.openxmlformats.org/presentationml/2006/main" xmlns:r="http://schemas.openxmlformats.org/officeDocument/2006/relationships">
-  <p:cSld>
-    <p:spTree>
-      <p:nvGrpSpPr>
-        <p:cNvPr id="1" name=""/>
-        <p:cNvGrpSpPr/>
-        <p:nvPr/>
-      </p:nvGrpSpPr>
-      <p:grpSpPr>
-        <a:xfrm>
-          <a:off x="0" y="0"/>
-          <a:ext cx="0" cy="0"/>
-          <a:chOff x="0" y="0"/>
-          <a:chExt cx="0" cy="0"/>
-        </a:xfrm>
-      </p:grpSpPr>
-      <p:sp>
-        <p:nvSpPr>
-          <p:cNvPr id="116" name="CustomShape 1"/>
-          <p:cNvSpPr/>
-          <p:nvPr/>
-        </p:nvSpPr>
-        <p:spPr>
-          <a:xfrm>
-            <a:off x="504000" y="301320"/>
-            <a:ext cx="9070200" cy="1260360"/>
-          </a:xfrm>
-          <a:prstGeom prst="rect">
-            <a:avLst/>
-          </a:prstGeom>
-          <a:noFill/>
-          <a:ln>
-            <a:noFill/>
-          </a:ln>
-        </p:spPr>
-        <p:txBody>
-          <a:bodyPr lIns="0" rIns="0" tIns="0" bIns="0" anchor="ctr"/>
-          <a:p>
-            <a:pPr algn="ctr">
-              <a:lnSpc>
-                <a:spcPct val="100000"/>
-              </a:lnSpc>
-            </a:pPr>
-            <a:r>
-              <a:rPr lang="en-IE" sz="4400">
-                <a:latin typeface="Arial"/>
-              </a:rPr>
-              <a:t>Types</a:t>
-            </a:r>
-            <a:endParaRPr/>
-          </a:p>
-        </p:txBody>
-      </p:sp>
-      <p:sp>
-        <p:nvSpPr>
-          <p:cNvPr id="117" name="CustomShape 2"/>
-          <p:cNvSpPr/>
-          <p:nvPr/>
-        </p:nvSpPr>
-        <p:spPr>
-          <a:xfrm>
-            <a:off x="504000" y="1768680"/>
-            <a:ext cx="9070200" cy="4382280"/>
-          </a:xfrm>
-          <a:prstGeom prst="rect">
-            <a:avLst/>
-          </a:prstGeom>
-          <a:noFill/>
-          <a:ln>
-            <a:noFill/>
-          </a:ln>
-        </p:spPr>
-        <p:txBody>
-          <a:bodyPr lIns="0" rIns="0" tIns="0" bIns="0"/>
-          <a:p>
-            <a:endParaRPr/>
-          </a:p>
-          <a:p>
-            <a:r>
-              <a:rPr lang="en-IE" sz="3200">
-                <a:latin typeface="Arial"/>
-              </a:rPr>
-              <a:t>Foundation of software industry</a:t>
-            </a:r>
-            <a:endParaRPr/>
-          </a:p>
-          <a:p>
-            <a:endParaRPr/>
-          </a:p>
-          <a:p>
-            <a:r>
-              <a:rPr lang="en-IE" sz="3200">
-                <a:latin typeface="Arial"/>
-              </a:rPr>
-              <a:t>Intellectual properties found in software:</a:t>
-            </a:r>
-            <a:endParaRPr/>
-          </a:p>
-          <a:p>
-            <a:pPr>
-              <a:lnSpc>
-                <a:spcPct val="100000"/>
-              </a:lnSpc>
-              <a:buFont typeface="Wingdings" charset="2"/>
-              <a:buChar char=""/>
-            </a:pPr>
-            <a:r>
-              <a:rPr lang="en-IE" sz="3200">
-                <a:latin typeface="Arial"/>
-              </a:rPr>
-              <a:t>Patents</a:t>
-            </a:r>
-            <a:endParaRPr/>
-          </a:p>
-          <a:p>
-            <a:pPr>
-              <a:lnSpc>
-                <a:spcPct val="100000"/>
-              </a:lnSpc>
-              <a:buFont typeface="Wingdings" charset="2"/>
-              <a:buChar char=""/>
-            </a:pPr>
-            <a:r>
-              <a:rPr lang="en-IE" sz="3200">
-                <a:latin typeface="Arial"/>
-              </a:rPr>
-              <a:t>Copyrights</a:t>
-            </a:r>
-            <a:endParaRPr/>
-          </a:p>
-          <a:p>
-            <a:pPr>
-              <a:lnSpc>
-                <a:spcPct val="100000"/>
-              </a:lnSpc>
-              <a:buFont typeface="Wingdings" charset="2"/>
-              <a:buChar char=""/>
-            </a:pPr>
-            <a:r>
-              <a:rPr lang="en-IE" sz="3200">
-                <a:latin typeface="Arial"/>
-              </a:rPr>
-              <a:t>Trade Secrets</a:t>
-            </a:r>
-            <a:endParaRPr/>
-          </a:p>
-          <a:p>
-            <a:pPr>
-              <a:lnSpc>
-                <a:spcPct val="100000"/>
-              </a:lnSpc>
-              <a:buFont typeface="Wingdings" charset="2"/>
-              <a:buChar char=""/>
-            </a:pPr>
-            <a:r>
-              <a:rPr lang="en-IE" sz="3200">
-                <a:latin typeface="Arial"/>
-              </a:rPr>
-              <a:t>Trademark</a:t>
-            </a:r>
-            <a:endParaRPr/>
-          </a:p>
-        </p:txBody>
-      </p:sp>
-    </p:spTree>
-  </p:cSld>
-  <p:timing>
-    <p:tnLst>
-      <p:par>
-        <p:cTn id="5" dur="indefinite" restart="never" nodeType="tmRoot">
-          <p:childTnLst>
-            <p:seq>
-              <p:cTn id="6" nodeType="mainSeq"/>
-              <p:prevCondLst>
-                <p:cond delay="0" evt="onPrev">
-                  <p:tgtEl>
-                    <p:sldTgt/>
-                  </p:tgtEl>
-                </p:cond>
-              </p:prevCondLst>
-              <p:nextCondLst>
-                <p:cond delay="0" evt="onNext">
-                  <p:tgtEl>
-                    <p:sldTgt/>
-                  </p:tgtEl>
-                </p:cond>
-              </p:nextCondLst>
-            </p:seq>
-          </p:childTnLst>
-        </p:cTn>
-      </p:par>
-    </p:tnLst>
-  </p:timing>
-</p:sld>
-</file>
-
-<file path=ppt/slides/slide4.xml><?xml version="1.0" encoding="utf-8"?>
-<p:sld xmlns:a="http://schemas.openxmlformats.org/drawingml/2006/main" xmlns:p="http://schemas.openxmlformats.org/presentationml/2006/main" xmlns:r="http://schemas.openxmlformats.org/officeDocument/2006/relationships">
-  <p:cSld>
-    <p:spTree>
-      <p:nvGrpSpPr>
-        <p:cNvPr id="1" name=""/>
-        <p:cNvGrpSpPr/>
-        <p:nvPr/>
-      </p:nvGrpSpPr>
-      <p:grpSpPr>
-        <a:xfrm>
-          <a:off x="0" y="0"/>
-          <a:ext cx="0" cy="0"/>
-          <a:chOff x="0" y="0"/>
-          <a:chExt cx="0" cy="0"/>
-        </a:xfrm>
-      </p:grpSpPr>
-      <p:sp>
-        <p:nvSpPr>
-          <p:cNvPr id="118" name="CustomShape 1"/>
-          <p:cNvSpPr/>
-          <p:nvPr/>
-        </p:nvSpPr>
-        <p:spPr>
-          <a:xfrm>
-            <a:off x="504000" y="301320"/>
-            <a:ext cx="9070200" cy="1260360"/>
-          </a:xfrm>
-          <a:prstGeom prst="rect">
-            <a:avLst/>
-          </a:prstGeom>
-          <a:noFill/>
-          <a:ln>
-            <a:noFill/>
-          </a:ln>
-        </p:spPr>
-        <p:txBody>
-          <a:bodyPr lIns="0" rIns="0" tIns="0" bIns="0" anchor="ctr"/>
-          <a:p>
-            <a:pPr algn="ctr">
-              <a:lnSpc>
-                <a:spcPct val="100000"/>
-              </a:lnSpc>
-            </a:pPr>
-            <a:r>
-              <a:rPr lang="en-IE" sz="4400">
-                <a:latin typeface="Arial"/>
-              </a:rPr>
-              <a:t>Trademark</a:t>
-            </a:r>
-            <a:endParaRPr/>
-          </a:p>
-        </p:txBody>
-      </p:sp>
-      <p:sp>
-        <p:nvSpPr>
-          <p:cNvPr id="119" name="CustomShape 2"/>
-          <p:cNvSpPr/>
-          <p:nvPr/>
-        </p:nvSpPr>
-        <p:spPr>
-          <a:xfrm>
-            <a:off x="504000" y="1768680"/>
-            <a:ext cx="9070200" cy="4382280"/>
-          </a:xfrm>
-          <a:prstGeom prst="rect">
-            <a:avLst/>
-          </a:prstGeom>
-          <a:noFill/>
-          <a:ln>
-            <a:noFill/>
-          </a:ln>
-        </p:spPr>
-        <p:txBody>
-          <a:bodyPr lIns="0" rIns="0" tIns="0" bIns="0"/>
-          <a:p>
-            <a:pPr>
-              <a:lnSpc>
-                <a:spcPct val="100000"/>
-              </a:lnSpc>
-            </a:pPr>
-            <a:endParaRPr/>
-          </a:p>
-          <a:p>
-            <a:pPr>
-              <a:lnSpc>
-                <a:spcPct val="100000"/>
-              </a:lnSpc>
-              <a:buFont typeface="Wingdings" charset="2"/>
-              <a:buChar char=""/>
-            </a:pPr>
-            <a:r>
-              <a:rPr lang="en-IE" sz="3200">
-                <a:latin typeface="Arial"/>
-              </a:rPr>
-              <a:t>Recognizable sign, design or expression</a:t>
-            </a:r>
-            <a:endParaRPr/>
-          </a:p>
-          <a:p>
-            <a:pPr>
-              <a:lnSpc>
-                <a:spcPct val="100000"/>
-              </a:lnSpc>
-            </a:pPr>
-            <a:endParaRPr/>
-          </a:p>
-          <a:p>
-            <a:pPr>
-              <a:lnSpc>
-                <a:spcPct val="100000"/>
-              </a:lnSpc>
-              <a:buFont typeface="Wingdings" charset="2"/>
-              <a:buChar char=""/>
-            </a:pPr>
-            <a:r>
-              <a:rPr lang="en-IE" sz="3200">
-                <a:latin typeface="Arial"/>
-              </a:rPr>
-              <a:t>Patents, copyrights and trade secrets can be used to protect technology itself</a:t>
-            </a:r>
-            <a:endParaRPr/>
-          </a:p>
-          <a:p>
-            <a:pPr>
-              <a:lnSpc>
-                <a:spcPct val="100000"/>
-              </a:lnSpc>
-            </a:pPr>
-            <a:endParaRPr/>
-          </a:p>
-          <a:p>
-            <a:pPr>
-              <a:lnSpc>
-                <a:spcPct val="100000"/>
-              </a:lnSpc>
-              <a:buFont typeface="Wingdings" charset="2"/>
-              <a:buChar char=""/>
-            </a:pPr>
-            <a:r>
-              <a:rPr lang="en-IE" sz="3200">
-                <a:latin typeface="Arial"/>
-              </a:rPr>
-              <a:t>Trademarks do not protect technology</a:t>
-            </a:r>
-            <a:endParaRPr/>
-          </a:p>
-        </p:txBody>
-      </p:sp>
-    </p:spTree>
-  </p:cSld>
-  <p:timing>
-    <p:tnLst>
-      <p:par>
-        <p:cTn id="7" dur="indefinite" restart="never" nodeType="tmRoot">
-          <p:childTnLst>
-            <p:seq>
-              <p:cTn id="8" nodeType="mainSeq"/>
-              <p:prevCondLst>
-                <p:cond delay="0" evt="onPrev">
-                  <p:tgtEl>
-                    <p:sldTgt/>
-                  </p:tgtEl>
-                </p:cond>
-              </p:prevCondLst>
-              <p:nextCondLst>
-                <p:cond delay="0" evt="onNext">
-                  <p:tgtEl>
-                    <p:sldTgt/>
-                  </p:tgtEl>
-                </p:cond>
-              </p:nextCondLst>
-            </p:seq>
-          </p:childTnLst>
-        </p:cTn>
-      </p:par>
-    </p:tnLst>
-  </p:timing>
-</p:sld>
-</file>
-
-<file path=ppt/slides/slide5.xml><?xml version="1.0" encoding="utf-8"?>
-<p:sld xmlns:a="http://schemas.openxmlformats.org/drawingml/2006/main" xmlns:p="http://schemas.openxmlformats.org/presentationml/2006/main" xmlns:r="http://schemas.openxmlformats.org/officeDocument/2006/relationships">
-  <p:cSld>
-    <p:spTree>
-      <p:nvGrpSpPr>
-        <p:cNvPr id="1" name=""/>
-        <p:cNvGrpSpPr/>
-        <p:nvPr/>
-      </p:nvGrpSpPr>
-      <p:grpSpPr>
-        <a:xfrm>
-          <a:off x="0" y="0"/>
-          <a:ext cx="0" cy="0"/>
-          <a:chOff x="0" y="0"/>
-          <a:chExt cx="0" cy="0"/>
-        </a:xfrm>
-      </p:grpSpPr>
-      <p:sp>
-        <p:nvSpPr>
-          <p:cNvPr id="120" name="CustomShape 1"/>
-          <p:cNvSpPr/>
-          <p:nvPr/>
-        </p:nvSpPr>
-        <p:spPr>
-          <a:xfrm>
-            <a:off x="504000" y="301320"/>
-            <a:ext cx="9070200" cy="1260360"/>
-          </a:xfrm>
-          <a:prstGeom prst="rect">
-            <a:avLst/>
-          </a:prstGeom>
-          <a:noFill/>
-          <a:ln>
-            <a:noFill/>
-          </a:ln>
-        </p:spPr>
-        <p:txBody>
-          <a:bodyPr lIns="0" rIns="0" tIns="0" bIns="0" anchor="ctr"/>
-          <a:p>
-            <a:pPr algn="ctr">
-              <a:lnSpc>
-                <a:spcPct val="100000"/>
-              </a:lnSpc>
-            </a:pPr>
-            <a:r>
-              <a:rPr lang="en-IE" sz="4400">
-                <a:latin typeface="Arial"/>
-              </a:rPr>
-              <a:t>Patents</a:t>
-            </a:r>
-            <a:endParaRPr/>
-          </a:p>
-        </p:txBody>
-      </p:sp>
-      <p:sp>
-        <p:nvSpPr>
-          <p:cNvPr id="121" name="CustomShape 2"/>
-          <p:cNvSpPr/>
-          <p:nvPr/>
-        </p:nvSpPr>
-        <p:spPr>
-          <a:xfrm>
-            <a:off x="504000" y="1768680"/>
-            <a:ext cx="9070200" cy="4382280"/>
-          </a:xfrm>
-          <a:prstGeom prst="rect">
-            <a:avLst/>
-          </a:prstGeom>
-          <a:noFill/>
-          <a:ln>
-            <a:noFill/>
-          </a:ln>
-        </p:spPr>
-        <p:txBody>
-          <a:bodyPr lIns="0" rIns="0" tIns="0" bIns="0"/>
-          <a:p>
-            <a:r>
-              <a:rPr lang="en-IE" sz="3200">
-                <a:latin typeface="Arial"/>
-              </a:rPr>
-              <a:t> </a:t>
-            </a:r>
-            <a:endParaRPr/>
-          </a:p>
-          <a:p>
-            <a:pPr>
-              <a:lnSpc>
-                <a:spcPct val="100000"/>
-              </a:lnSpc>
-              <a:buFont typeface="Wingdings" charset="2"/>
-              <a:buChar char=""/>
-            </a:pPr>
-            <a:r>
-              <a:rPr lang="en-IE" sz="3200">
-                <a:latin typeface="Arial"/>
-              </a:rPr>
-              <a:t>Protection of “ideas”</a:t>
-            </a:r>
-            <a:endParaRPr/>
-          </a:p>
-          <a:p>
-            <a:pPr>
-              <a:lnSpc>
-                <a:spcPct val="100000"/>
-              </a:lnSpc>
-            </a:pPr>
-            <a:endParaRPr/>
-          </a:p>
-          <a:p>
-            <a:pPr>
-              <a:lnSpc>
-                <a:spcPct val="100000"/>
-              </a:lnSpc>
-              <a:buFont typeface="Wingdings" charset="2"/>
-              <a:buChar char=""/>
-            </a:pPr>
-            <a:r>
-              <a:rPr lang="en-IE" sz="3200">
-                <a:latin typeface="Arial"/>
-              </a:rPr>
-              <a:t>20 year exclusive monopoly</a:t>
-            </a:r>
-            <a:endParaRPr/>
-          </a:p>
-          <a:p>
-            <a:pPr>
-              <a:lnSpc>
-                <a:spcPct val="100000"/>
-              </a:lnSpc>
-            </a:pPr>
-            <a:endParaRPr/>
-          </a:p>
-          <a:p>
-            <a:pPr>
-              <a:lnSpc>
-                <a:spcPct val="100000"/>
-              </a:lnSpc>
-              <a:buFont typeface="Wingdings" charset="2"/>
-              <a:buChar char=""/>
-            </a:pPr>
-            <a:r>
-              <a:rPr lang="en-IE" sz="3200">
-                <a:latin typeface="Arial"/>
-              </a:rPr>
-              <a:t>Described in detail</a:t>
-            </a:r>
-            <a:endParaRPr/>
-          </a:p>
-          <a:p>
-            <a:pPr>
-              <a:lnSpc>
-                <a:spcPct val="100000"/>
-              </a:lnSpc>
-            </a:pPr>
-            <a:endParaRPr/>
-          </a:p>
-          <a:p>
-            <a:pPr>
-              <a:lnSpc>
-                <a:spcPct val="100000"/>
-              </a:lnSpc>
-              <a:buFont typeface="Wingdings" charset="2"/>
-              <a:buChar char=""/>
-            </a:pPr>
-            <a:r>
-              <a:rPr lang="en-IE" sz="3200">
-                <a:latin typeface="Arial"/>
-              </a:rPr>
-              <a:t>Available to public</a:t>
-            </a:r>
-            <a:endParaRPr/>
-          </a:p>
-        </p:txBody>
-      </p:sp>
-    </p:spTree>
-  </p:cSld>
-  <p:timing>
-    <p:tnLst>
-      <p:par>
-        <p:cTn id="9" dur="indefinite" restart="never" nodeType="tmRoot">
-          <p:childTnLst>
-            <p:seq>
-              <p:cTn id="10" nodeType="mainSeq"/>
-              <p:prevCondLst>
-                <p:cond delay="0" evt="onPrev">
-                  <p:tgtEl>
-                    <p:sldTgt/>
-                  </p:tgtEl>
-                </p:cond>
-              </p:prevCondLst>
-              <p:nextCondLst>
-                <p:cond delay="0" evt="onNext">
-                  <p:tgtEl>
-                    <p:sldTgt/>
-                  </p:tgtEl>
-                </p:cond>
-              </p:nextCondLst>
-            </p:seq>
-          </p:childTnLst>
-        </p:cTn>
-      </p:par>
-    </p:tnLst>
-  </p:timing>
-</p:sld>
-</file>
-
-<file path=ppt/slides/slide6.xml><?xml version="1.0" encoding="utf-8"?>
-<p:sld xmlns:a="http://schemas.openxmlformats.org/drawingml/2006/main" xmlns:p="http://schemas.openxmlformats.org/presentationml/2006/main" xmlns:r="http://schemas.openxmlformats.org/officeDocument/2006/relationships">
-  <p:cSld>
-    <p:spTree>
-      <p:nvGrpSpPr>
-        <p:cNvPr id="1" name=""/>
-        <p:cNvGrpSpPr/>
-        <p:nvPr/>
-      </p:nvGrpSpPr>
-      <p:grpSpPr>
-        <a:xfrm>
-          <a:off x="0" y="0"/>
-          <a:ext cx="0" cy="0"/>
-          <a:chOff x="0" y="0"/>
-          <a:chExt cx="0" cy="0"/>
-        </a:xfrm>
-      </p:grpSpPr>
-      <p:sp>
-        <p:nvSpPr>
-          <p:cNvPr id="122" name="CustomShape 1"/>
-          <p:cNvSpPr/>
-          <p:nvPr/>
-        </p:nvSpPr>
-        <p:spPr>
-          <a:xfrm>
-            <a:off x="504000" y="301320"/>
-            <a:ext cx="9070200" cy="1260360"/>
-          </a:xfrm>
-          <a:prstGeom prst="rect">
-            <a:avLst/>
-          </a:prstGeom>
-          <a:noFill/>
-          <a:ln>
-            <a:noFill/>
-          </a:ln>
-        </p:spPr>
-        <p:txBody>
-          <a:bodyPr lIns="0" rIns="0" tIns="0" bIns="0" anchor="ctr"/>
-          <a:p>
-            <a:pPr algn="ctr">
-              <a:lnSpc>
-                <a:spcPct val="100000"/>
-              </a:lnSpc>
-            </a:pPr>
-            <a:r>
-              <a:rPr lang="en-IE" sz="4400">
-                <a:latin typeface="Arial"/>
-              </a:rPr>
-              <a:t>Obtaining Patents</a:t>
-            </a:r>
-            <a:endParaRPr/>
-          </a:p>
-        </p:txBody>
-      </p:sp>
-      <p:sp>
-        <p:nvSpPr>
-          <p:cNvPr id="123" name="CustomShape 2"/>
-          <p:cNvSpPr/>
-          <p:nvPr/>
-        </p:nvSpPr>
-        <p:spPr>
-          <a:xfrm>
-            <a:off x="504000" y="1768680"/>
-            <a:ext cx="9070200" cy="4382280"/>
-          </a:xfrm>
-          <a:prstGeom prst="rect">
-            <a:avLst/>
-          </a:prstGeom>
-          <a:noFill/>
-          <a:ln>
-            <a:noFill/>
-          </a:ln>
-        </p:spPr>
-        <p:txBody>
-          <a:bodyPr lIns="0" rIns="0" tIns="0" bIns="0"/>
-          <a:p>
-            <a:pPr>
-              <a:lnSpc>
-                <a:spcPct val="100000"/>
-              </a:lnSpc>
-            </a:pPr>
-            <a:endParaRPr/>
-          </a:p>
-          <a:p>
-            <a:pPr>
-              <a:lnSpc>
-                <a:spcPct val="100000"/>
-              </a:lnSpc>
-              <a:buFont typeface="Wingdings" charset="2"/>
-              <a:buChar char=""/>
-            </a:pPr>
-            <a:r>
-              <a:rPr lang="en-IE" sz="3200">
-                <a:latin typeface="Arial"/>
-              </a:rPr>
-              <a:t>Must apply to patent office</a:t>
-            </a:r>
-            <a:endParaRPr/>
-          </a:p>
-          <a:p>
-            <a:pPr>
-              <a:lnSpc>
-                <a:spcPct val="100000"/>
-              </a:lnSpc>
-            </a:pPr>
-            <a:endParaRPr/>
-          </a:p>
-          <a:p>
-            <a:pPr>
-              <a:lnSpc>
-                <a:spcPct val="100000"/>
-              </a:lnSpc>
-              <a:buFont typeface="Wingdings" charset="2"/>
-              <a:buChar char=""/>
-            </a:pPr>
-            <a:r>
-              <a:rPr lang="en-IE" sz="3200">
-                <a:latin typeface="Arial"/>
-              </a:rPr>
-              <a:t>Must be demonstrated as new, useful and “nonobvious”</a:t>
-            </a:r>
-            <a:endParaRPr/>
-          </a:p>
-          <a:p>
-            <a:pPr>
-              <a:lnSpc>
-                <a:spcPct val="100000"/>
-              </a:lnSpc>
-            </a:pPr>
-            <a:endParaRPr/>
-          </a:p>
-          <a:p>
-            <a:pPr>
-              <a:lnSpc>
-                <a:spcPct val="100000"/>
-              </a:lnSpc>
-              <a:buFont typeface="Wingdings" charset="2"/>
-              <a:buChar char=""/>
-            </a:pPr>
-            <a:r>
-              <a:rPr lang="en-IE" sz="3200">
-                <a:latin typeface="Arial"/>
-              </a:rPr>
-              <a:t>More than trivial, obvious next step in the advance of technology</a:t>
-            </a:r>
-            <a:endParaRPr/>
-          </a:p>
-        </p:txBody>
-      </p:sp>
-    </p:spTree>
-  </p:cSld>
-  <p:timing>
-    <p:tnLst>
-      <p:par>
-        <p:cTn id="11" dur="indefinite" restart="never" nodeType="tmRoot">
-          <p:childTnLst>
-            <p:seq>
-              <p:cTn id="12" nodeType="mainSeq"/>
-              <p:prevCondLst>
-                <p:cond delay="0" evt="onPrev">
-                  <p:tgtEl>
-                    <p:sldTgt/>
-                  </p:tgtEl>
-                </p:cond>
-              </p:prevCondLst>
-              <p:nextCondLst>
-                <p:cond delay="0" evt="onNext">
-                  <p:tgtEl>
-                    <p:sldTgt/>
-                  </p:tgtEl>
-                </p:cond>
-              </p:nextCondLst>
-            </p:seq>
-          </p:childTnLst>
-        </p:cTn>
-      </p:par>
-    </p:tnLst>
-  </p:timing>
-</p:sld>
-</file>
-
-<file path=ppt/slides/slide7.xml><?xml version="1.0" encoding="utf-8"?>
-<p:sld xmlns:a="http://schemas.openxmlformats.org/drawingml/2006/main" xmlns:p="http://schemas.openxmlformats.org/presentationml/2006/main" xmlns:r="http://schemas.openxmlformats.org/officeDocument/2006/relationships">
-  <p:cSld>
-    <p:spTree>
-      <p:nvGrpSpPr>
-        <p:cNvPr id="1" name=""/>
-        <p:cNvGrpSpPr/>
-        <p:nvPr/>
-      </p:nvGrpSpPr>
-      <p:grpSpPr>
-        <a:xfrm>
-          <a:off x="0" y="0"/>
-          <a:ext cx="0" cy="0"/>
-          <a:chOff x="0" y="0"/>
-          <a:chExt cx="0" cy="0"/>
-        </a:xfrm>
-      </p:grpSpPr>
-      <p:sp>
-        <p:nvSpPr>
-          <p:cNvPr id="124" name="CustomShape 1"/>
-          <p:cNvSpPr/>
-          <p:nvPr/>
-        </p:nvSpPr>
-        <p:spPr>
-          <a:xfrm>
-            <a:off x="504000" y="301320"/>
-            <a:ext cx="9070200" cy="1260360"/>
-          </a:xfrm>
-          <a:prstGeom prst="rect">
-            <a:avLst/>
-          </a:prstGeom>
-          <a:noFill/>
-          <a:ln>
-            <a:noFill/>
-          </a:ln>
-        </p:spPr>
-        <p:txBody>
-          <a:bodyPr lIns="0" rIns="0" tIns="0" bIns="0" anchor="ctr"/>
-          <a:p>
-            <a:pPr algn="ctr">
-              <a:lnSpc>
-                <a:spcPct val="100000"/>
-              </a:lnSpc>
-            </a:pPr>
-            <a:r>
-              <a:rPr lang="en-IE" sz="4400">
-                <a:latin typeface="Arial"/>
-              </a:rPr>
-              <a:t>Patent examples</a:t>
-            </a:r>
-            <a:endParaRPr/>
-          </a:p>
-        </p:txBody>
-      </p:sp>
-      <p:sp>
-        <p:nvSpPr>
-          <p:cNvPr id="125" name="CustomShape 2"/>
-          <p:cNvSpPr/>
-          <p:nvPr/>
-        </p:nvSpPr>
-        <p:spPr>
-          <a:xfrm>
-            <a:off x="504000" y="1768680"/>
-            <a:ext cx="9070200" cy="4382280"/>
-          </a:xfrm>
-          <a:prstGeom prst="rect">
-            <a:avLst/>
-          </a:prstGeom>
-          <a:noFill/>
-          <a:ln>
-            <a:noFill/>
-          </a:ln>
-        </p:spPr>
-        <p:txBody>
-          <a:bodyPr lIns="0" rIns="0" tIns="0" bIns="0"/>
-          <a:p>
-            <a:pPr>
-              <a:lnSpc>
-                <a:spcPct val="100000"/>
-              </a:lnSpc>
-            </a:pPr>
-            <a:endParaRPr/>
-          </a:p>
-          <a:p>
-            <a:pPr>
-              <a:lnSpc>
-                <a:spcPct val="100000"/>
-              </a:lnSpc>
-              <a:buFont typeface="Wingdings" charset="2"/>
-              <a:buChar char=""/>
-            </a:pPr>
-            <a:r>
-              <a:rPr lang="en-IE" sz="3200">
-                <a:latin typeface="Arial"/>
-              </a:rPr>
-              <a:t>Algorithms, methods, systems</a:t>
-            </a:r>
-            <a:endParaRPr/>
-          </a:p>
-          <a:p>
-            <a:pPr>
-              <a:lnSpc>
-                <a:spcPct val="100000"/>
-              </a:lnSpc>
-            </a:pPr>
-            <a:endParaRPr/>
-          </a:p>
-          <a:p>
-            <a:pPr>
-              <a:lnSpc>
-                <a:spcPct val="100000"/>
-              </a:lnSpc>
-              <a:buFont typeface="Wingdings" charset="2"/>
-              <a:buChar char=""/>
-            </a:pPr>
-            <a:r>
-              <a:rPr lang="en-IE" sz="3200">
-                <a:latin typeface="Arial"/>
-              </a:rPr>
-              <a:t>User-Interface Feature, Menu features</a:t>
-            </a:r>
-            <a:endParaRPr/>
-          </a:p>
-          <a:p>
-            <a:pPr>
-              <a:lnSpc>
-                <a:spcPct val="100000"/>
-              </a:lnSpc>
-            </a:pPr>
-            <a:endParaRPr/>
-          </a:p>
-          <a:p>
-            <a:pPr>
-              <a:lnSpc>
-                <a:spcPct val="100000"/>
-              </a:lnSpc>
-              <a:buFont typeface="Wingdings" charset="2"/>
-              <a:buChar char=""/>
-            </a:pPr>
-            <a:r>
-              <a:rPr lang="en-IE" sz="3200">
-                <a:latin typeface="Arial"/>
-              </a:rPr>
-              <a:t>Apple patents</a:t>
-            </a:r>
-            <a:endParaRPr/>
-          </a:p>
-        </p:txBody>
-      </p:sp>
-      <p:pic>
-        <p:nvPicPr>
-          <p:cNvPr id="126" name="" descr=""/>
-          <p:cNvPicPr/>
-          <p:nvPr/>
-        </p:nvPicPr>
-        <p:blipFill>
-          <a:blip r:embed="rId1"/>
-          <a:stretch>
-            <a:fillRect/>
-          </a:stretch>
-        </p:blipFill>
-        <p:spPr>
-          <a:xfrm>
-            <a:off x="432000" y="4477320"/>
-            <a:ext cx="4836960" cy="2505960"/>
-          </a:xfrm>
-          <a:prstGeom prst="rect">
-            <a:avLst/>
-          </a:prstGeom>
-          <a:ln>
-            <a:noFill/>
-          </a:ln>
-        </p:spPr>
-      </p:pic>
-      <p:pic>
-        <p:nvPicPr>
-          <p:cNvPr id="127" name="" descr=""/>
-          <p:cNvPicPr/>
-          <p:nvPr/>
-        </p:nvPicPr>
-        <p:blipFill>
-          <a:blip r:embed="rId2"/>
-          <a:stretch>
-            <a:fillRect/>
-          </a:stretch>
-        </p:blipFill>
-        <p:spPr>
-          <a:xfrm>
-            <a:off x="5849280" y="4680000"/>
-            <a:ext cx="2286000" cy="2303280"/>
-          </a:xfrm>
-          <a:prstGeom prst="rect">
-            <a:avLst/>
-          </a:prstGeom>
-          <a:ln>
-            <a:noFill/>
-          </a:ln>
-        </p:spPr>
-      </p:pic>
-    </p:spTree>
-  </p:cSld>
-  <p:timing>
-    <p:tnLst>
-      <p:par>
-        <p:cTn id="13" dur="indefinite" restart="never" nodeType="tmRoot">
-          <p:childTnLst>
-            <p:seq>
-              <p:cTn id="14" nodeType="mainSeq"/>
-              <p:prevCondLst>
-                <p:cond delay="0" evt="onPrev">
-                  <p:tgtEl>
-                    <p:sldTgt/>
-                  </p:tgtEl>
-                </p:cond>
-              </p:prevCondLst>
-              <p:nextCondLst>
-                <p:cond delay="0" evt="onNext">
-                  <p:tgtEl>
-                    <p:sldTgt/>
-                  </p:tgtEl>
-                </p:cond>
-              </p:nextCondLst>
-            </p:seq>
-          </p:childTnLst>
-        </p:cTn>
-      </p:par>
-    </p:tnLst>
-  </p:timing>
-</p:sld>
-</file>
-
-<file path=ppt/slides/slide8.xml><?xml version="1.0" encoding="utf-8"?>
-<p:sld xmlns:a="http://schemas.openxmlformats.org/drawingml/2006/main" xmlns:p="http://schemas.openxmlformats.org/presentationml/2006/main" xmlns:r="http://schemas.openxmlformats.org/officeDocument/2006/relationships">
-  <p:cSld>
-    <p:bg>
-      <p:bgPr>
-        <a:solidFill>
-          <a:srgbClr val="ffffff"/>
-        </a:solidFill>
-      </p:bgPr>
-    </p:bg>
-    <p:spTree>
-      <p:nvGrpSpPr>
-        <p:cNvPr id="1" name=""/>
-        <p:cNvGrpSpPr/>
-        <p:nvPr/>
-      </p:nvGrpSpPr>
-      <p:grpSpPr>
-        <a:xfrm>
-          <a:off x="0" y="0"/>
-          <a:ext cx="0" cy="0"/>
-          <a:chOff x="0" y="0"/>
-          <a:chExt cx="0" cy="0"/>
-        </a:xfrm>
-      </p:grpSpPr>
-      <p:sp>
-        <p:nvSpPr>
-          <p:cNvPr id="128" name="CustomShape 1"/>
-          <p:cNvSpPr/>
-          <p:nvPr/>
-        </p:nvSpPr>
-        <p:spPr>
-          <a:xfrm>
-            <a:off x="504360" y="301320"/>
-            <a:ext cx="9071280" cy="1261800"/>
-          </a:xfrm>
-          <a:prstGeom prst="rect">
-            <a:avLst/>
-          </a:prstGeom>
-          <a:noFill/>
-          <a:ln>
-            <a:noFill/>
-          </a:ln>
-        </p:spPr>
-        <p:txBody>
-          <a:bodyPr lIns="0" rIns="0" tIns="0" bIns="0" anchor="ctr"/>
-          <a:p>
-            <a:pPr algn="ctr">
-              <a:lnSpc>
-                <a:spcPct val="100000"/>
-              </a:lnSpc>
-              <a:buSzPct val="45000"/>
-              <a:buFont typeface="StarSymbol"/>
-              <a:buChar char="l"/>
-            </a:pPr>
-            <a:r>
-              <a:rPr lang="en-IE" sz="4400">
-                <a:latin typeface="Arial"/>
-                <a:ea typeface="宋体"/>
-              </a:rPr>
-              <a:t>Copyright</a:t>
-            </a:r>
-            <a:endParaRPr/>
-          </a:p>
-        </p:txBody>
-      </p:sp>
-      <p:sp>
-        <p:nvSpPr>
-          <p:cNvPr id="129" name="CustomShape 2"/>
-          <p:cNvSpPr/>
-          <p:nvPr/>
-        </p:nvSpPr>
-        <p:spPr>
-          <a:xfrm>
-            <a:off x="504720" y="1767960"/>
-            <a:ext cx="9073080" cy="4963680"/>
-          </a:xfrm>
-          <a:prstGeom prst="rect">
-            <a:avLst/>
-          </a:prstGeom>
-          <a:noFill/>
-          <a:ln>
-            <a:noFill/>
-          </a:ln>
-        </p:spPr>
-        <p:txBody>
-          <a:bodyPr lIns="0" rIns="0" tIns="0" bIns="0"/>
-          <a:p>
-            <a:pPr>
-              <a:lnSpc>
-                <a:spcPct val="80000"/>
-              </a:lnSpc>
-            </a:pPr>
-            <a:endParaRPr/>
-          </a:p>
-          <a:p>
-            <a:pPr>
-              <a:lnSpc>
-                <a:spcPct val="80000"/>
-              </a:lnSpc>
-              <a:buSzPct val="25000"/>
-              <a:buFont typeface="Wingdings" charset="2"/>
-              <a:buChar char=""/>
-            </a:pPr>
-            <a:r>
-              <a:rPr lang="en-IE" sz="2800">
-                <a:latin typeface="Arial"/>
-                <a:ea typeface="宋体"/>
-              </a:rPr>
-              <a:t>What is copyright?</a:t>
-            </a:r>
-            <a:endParaRPr/>
-          </a:p>
-          <a:p>
-            <a:pPr>
-              <a:lnSpc>
-                <a:spcPct val="80000"/>
-              </a:lnSpc>
-            </a:pPr>
-            <a:endParaRPr/>
-          </a:p>
-          <a:p>
-            <a:pPr>
-              <a:lnSpc>
-                <a:spcPct val="80000"/>
-              </a:lnSpc>
-            </a:pPr>
-            <a:endParaRPr/>
-          </a:p>
-          <a:p>
-            <a:pPr>
-              <a:lnSpc>
-                <a:spcPct val="80000"/>
-              </a:lnSpc>
-            </a:pPr>
-            <a:endParaRPr/>
-          </a:p>
-          <a:p>
-            <a:pPr>
-              <a:lnSpc>
-                <a:spcPct val="80000"/>
-              </a:lnSpc>
-            </a:pPr>
-            <a:endParaRPr/>
-          </a:p>
-          <a:p>
-            <a:pPr>
-              <a:lnSpc>
-                <a:spcPct val="80000"/>
-              </a:lnSpc>
-              <a:buSzPct val="25000"/>
-              <a:buFont typeface="Wingdings" charset="2"/>
-              <a:buChar char=""/>
-            </a:pPr>
-            <a:r>
-              <a:rPr lang="en-IE" sz="2800">
-                <a:latin typeface="Arial"/>
-                <a:ea typeface="宋体"/>
-              </a:rPr>
-              <a:t>What is software copyright?</a:t>
-            </a:r>
-            <a:endParaRPr/>
-          </a:p>
-          <a:p>
-            <a:pPr>
-              <a:lnSpc>
-                <a:spcPct val="80000"/>
-              </a:lnSpc>
-            </a:pPr>
-            <a:endParaRPr/>
-          </a:p>
-          <a:p>
-            <a:pPr>
-              <a:lnSpc>
-                <a:spcPct val="80000"/>
-              </a:lnSpc>
-            </a:pPr>
-            <a:r>
-              <a:rPr lang="en-IE" sz="2800">
-                <a:latin typeface="Arial"/>
-                <a:ea typeface="宋体"/>
-              </a:rPr>
-              <a:t>    </a:t>
-            </a:r>
-            <a:r>
-              <a:rPr lang="en-IE" sz="2800">
-                <a:latin typeface="Arial"/>
-                <a:ea typeface="宋体"/>
-              </a:rPr>
-              <a:t>1. all the program code itself</a:t>
-            </a:r>
-            <a:endParaRPr/>
-          </a:p>
-          <a:p>
-            <a:pPr>
-              <a:lnSpc>
-                <a:spcPct val="80000"/>
-              </a:lnSpc>
-            </a:pPr>
-            <a:endParaRPr/>
-          </a:p>
-          <a:p>
-            <a:pPr>
-              <a:lnSpc>
-                <a:spcPct val="80000"/>
-              </a:lnSpc>
-            </a:pPr>
-            <a:r>
-              <a:rPr lang="en-IE" sz="2800">
-                <a:latin typeface="Arial"/>
-                <a:ea typeface="宋体"/>
-              </a:rPr>
-              <a:t>    </a:t>
-            </a:r>
-            <a:r>
-              <a:rPr lang="en-IE" sz="2800">
-                <a:latin typeface="Arial"/>
-                <a:ea typeface="宋体"/>
-              </a:rPr>
-              <a:t>2. documents that used to describe the contents, </a:t>
-            </a:r>
-            <a:endParaRPr/>
-          </a:p>
-          <a:p>
-            <a:pPr>
-              <a:lnSpc>
-                <a:spcPct val="80000"/>
-              </a:lnSpc>
-            </a:pPr>
-            <a:r>
-              <a:rPr lang="en-IE" sz="2800">
-                <a:latin typeface="Arial"/>
-                <a:ea typeface="宋体"/>
-              </a:rPr>
-              <a:t>        </a:t>
-            </a:r>
-            <a:r>
-              <a:rPr lang="en-IE" sz="2800">
-                <a:latin typeface="Arial"/>
-                <a:ea typeface="宋体"/>
-              </a:rPr>
-              <a:t>design, testing results, etc. of a program.</a:t>
-            </a:r>
-            <a:endParaRPr/>
-          </a:p>
-          <a:p>
-            <a:pPr>
-              <a:lnSpc>
-                <a:spcPct val="80000"/>
-              </a:lnSpc>
-            </a:pPr>
-            <a:r>
-              <a:rPr lang="en-IE" sz="2800">
-                <a:latin typeface="Arial"/>
-                <a:ea typeface="宋体"/>
-              </a:rPr>
-              <a:t>    </a:t>
-            </a:r>
-            <a:endParaRPr/>
-          </a:p>
-        </p:txBody>
-      </p:sp>
-      <p:pic>
-        <p:nvPicPr>
-          <p:cNvPr id="130" name="" descr=""/>
-          <p:cNvPicPr/>
-          <p:nvPr/>
-        </p:nvPicPr>
-        <p:blipFill>
-          <a:blip r:embed="rId1"/>
-          <a:stretch>
-            <a:fillRect/>
-          </a:stretch>
-        </p:blipFill>
-        <p:spPr>
-          <a:xfrm>
-            <a:off x="5905800" y="2123640"/>
-            <a:ext cx="3245040" cy="2303280"/>
-          </a:xfrm>
-          <a:prstGeom prst="rect">
-            <a:avLst/>
-          </a:prstGeom>
-          <a:ln>
-            <a:noFill/>
-          </a:ln>
-        </p:spPr>
-      </p:pic>
-    </p:spTree>
-  </p:cSld>
-  <p:timing>
-    <p:tnLst>
-      <p:par>
-        <p:cTn id="15" dur="indefinite" restart="never" nodeType="tmRoot">
-          <p:childTnLst>
-            <p:seq>
-              <p:cTn id="16" nodeType="mainSeq"/>
-              <p:prevCondLst>
-                <p:cond delay="0" evt="onPrev">
-                  <p:tgtEl>
-                    <p:sldTgt/>
-                  </p:tgtEl>
-                </p:cond>
-              </p:prevCondLst>
-              <p:nextCondLst>
-                <p:cond delay="0" evt="onNext">
-                  <p:tgtEl>
-                    <p:sldTgt/>
-                  </p:tgtEl>
-                </p:cond>
-              </p:nextCondLst>
-            </p:seq>
-          </p:childTnLst>
-        </p:cTn>
-      </p:par>
-    </p:tnLst>
-  </p:timing>
-</p:sld>
-</file>
-
-<file path=ppt/slides/slide9.xml><?xml version="1.0" encoding="utf-8"?>
-<p:sld xmlns:a="http://schemas.openxmlformats.org/drawingml/2006/main" xmlns:p="http://schemas.openxmlformats.org/presentationml/2006/main" xmlns:r="http://schemas.openxmlformats.org/officeDocument/2006/relationships">
-  <p:cSld>
-    <p:bg>
-      <p:bgPr>
-        <a:solidFill>
-          <a:srgbClr val="ffffff"/>
-        </a:solidFill>
-      </p:bgPr>
-    </p:bg>
-    <p:spTree>
-      <p:nvGrpSpPr>
-        <p:cNvPr id="1" name=""/>
-        <p:cNvGrpSpPr/>
-        <p:nvPr/>
-      </p:nvGrpSpPr>
-      <p:grpSpPr>
-        <a:xfrm>
-          <a:off x="0" y="0"/>
-          <a:ext cx="0" cy="0"/>
-          <a:chOff x="0" y="0"/>
-          <a:chExt cx="0" cy="0"/>
-        </a:xfrm>
-      </p:grpSpPr>
-      <p:sp>
-        <p:nvSpPr>
-          <p:cNvPr id="131" name="CustomShape 1"/>
-          <p:cNvSpPr/>
-          <p:nvPr/>
-        </p:nvSpPr>
-        <p:spPr>
-          <a:xfrm>
-            <a:off x="504360" y="301320"/>
-            <a:ext cx="9071280" cy="1261800"/>
-          </a:xfrm>
-          <a:prstGeom prst="rect">
-            <a:avLst/>
-          </a:prstGeom>
-          <a:noFill/>
-          <a:ln>
-            <a:noFill/>
-          </a:ln>
-        </p:spPr>
-        <p:txBody>
-          <a:bodyPr lIns="0" rIns="0" tIns="0" bIns="0" anchor="ctr"/>
-          <a:p>
-            <a:pPr algn="ctr">
-              <a:lnSpc>
-                <a:spcPct val="100000"/>
-              </a:lnSpc>
-              <a:buSzPct val="45000"/>
-              <a:buFont typeface="StarSymbol"/>
-              <a:buChar char="l"/>
-            </a:pPr>
-            <a:r>
-              <a:rPr lang="en-IE" sz="4400">
-                <a:latin typeface="Arial"/>
-              </a:rPr>
-              <a:t>C</a:t>
-            </a:r>
-            <a:r>
-              <a:rPr lang="en-IE" sz="4400">
-                <a:latin typeface="Arial"/>
-                <a:ea typeface="宋体"/>
-              </a:rPr>
-              <a:t>opyright</a:t>
-            </a:r>
-            <a:endParaRPr/>
-          </a:p>
-        </p:txBody>
-      </p:sp>
-      <p:sp>
-        <p:nvSpPr>
-          <p:cNvPr id="132" name="CustomShape 2"/>
-          <p:cNvSpPr/>
-          <p:nvPr/>
-        </p:nvSpPr>
-        <p:spPr>
-          <a:xfrm>
-            <a:off x="791640" y="1907640"/>
-            <a:ext cx="8496720" cy="3097080"/>
-          </a:xfrm>
-          <a:prstGeom prst="rect">
-            <a:avLst/>
-          </a:prstGeom>
-          <a:noFill/>
-          <a:ln>
-            <a:noFill/>
-          </a:ln>
-        </p:spPr>
-        <p:txBody>
-          <a:bodyPr lIns="0" rIns="0" tIns="0" bIns="0"/>
-          <a:p>
-            <a:pPr>
-              <a:lnSpc>
-                <a:spcPct val="100000"/>
-              </a:lnSpc>
-            </a:pPr>
-            <a:r>
-              <a:rPr lang="en-IE" sz="3200">
-                <a:latin typeface="Arial"/>
-                <a:ea typeface="宋体"/>
-              </a:rPr>
               <a:t>The difference between software copyright and patent:</a:t>
             </a:r>
             <a:endParaRPr/>
@@ -6687,13 +4508,13 @@
       </p:sp>
       <p:graphicFrame>
         <p:nvGraphicFramePr>
-          <p:cNvPr id="133" name="Table 3"/>
+          <p:cNvPr id="137" name="Table 3"/>
           <p:cNvGraphicFramePr/>
           <p:nvPr/>
         </p:nvGraphicFramePr>
         <p:xfrm>
           <a:off x="1316160" y="3419280"/>
-          <a:ext cx="7253280" cy="1512360"/>
+          <a:ext cx="7252920" cy="1512000"/>
         </p:xfrm>
         <a:graphic>
           <a:graphicData uri="http://schemas.openxmlformats.org/drawingml/2006/table">
@@ -6702,7 +4523,7 @@
               <a:tblGrid>
                 <a:gridCol w="2184480"/>
                 <a:gridCol w="2913120"/>
-                <a:gridCol w="2156040"/>
+                <a:gridCol w="2155320"/>
               </a:tblGrid>
               <a:tr h="687240">
                 <a:tc>
@@ -6778,7 +4599,7 @@
                   <a:tcPr/>
                 </a:tc>
               </a:tr>
-              <a:tr h="825480">
+              <a:tr h="824760">
                 <a:tc>
                   <a:txBody>
                     <a:bodyPr/>
@@ -6858,14 +4679,14 @@
       </p:graphicFrame>
       <p:sp>
         <p:nvSpPr>
-          <p:cNvPr id="134" name="CustomShape 4"/>
+          <p:cNvPr id="138" name="CustomShape 4"/>
           <p:cNvSpPr/>
           <p:nvPr/>
         </p:nvSpPr>
         <p:spPr>
           <a:xfrm>
             <a:off x="789120" y="5283000"/>
-            <a:ext cx="8285400" cy="855720"/>
+            <a:ext cx="8285040" cy="855360"/>
           </a:xfrm>
           <a:prstGeom prst="rect">
             <a:avLst/>
@@ -6893,6 +4714,2342 @@
           </a:p>
         </p:txBody>
       </p:sp>
+    </p:spTree>
+  </p:cSld>
+  <p:timing>
+    <p:tnLst>
+      <p:par>
+        <p:cTn id="19" dur="indefinite" restart="never" nodeType="tmRoot">
+          <p:childTnLst>
+            <p:seq>
+              <p:cTn id="20" nodeType="mainSeq"/>
+              <p:prevCondLst>
+                <p:cond delay="0" evt="onPrev">
+                  <p:tgtEl>
+                    <p:sldTgt/>
+                  </p:tgtEl>
+                </p:cond>
+              </p:prevCondLst>
+              <p:nextCondLst>
+                <p:cond delay="0" evt="onNext">
+                  <p:tgtEl>
+                    <p:sldTgt/>
+                  </p:tgtEl>
+                </p:cond>
+              </p:nextCondLst>
+            </p:seq>
+          </p:childTnLst>
+        </p:cTn>
+      </p:par>
+    </p:tnLst>
+  </p:timing>
+</p:sld>
+</file>
+
+<file path=ppt/slides/slide11.xml><?xml version="1.0" encoding="utf-8"?>
+<p:sld xmlns:a="http://schemas.openxmlformats.org/drawingml/2006/main" xmlns:p="http://schemas.openxmlformats.org/presentationml/2006/main" xmlns:r="http://schemas.openxmlformats.org/officeDocument/2006/relationships">
+  <p:cSld>
+    <p:bg>
+      <p:bgPr>
+        <a:solidFill>
+          <a:srgbClr val="ffffff"/>
+        </a:solidFill>
+      </p:bgPr>
+    </p:bg>
+    <p:spTree>
+      <p:nvGrpSpPr>
+        <p:cNvPr id="1" name=""/>
+        <p:cNvGrpSpPr/>
+        <p:nvPr/>
+      </p:nvGrpSpPr>
+      <p:grpSpPr>
+        <a:xfrm>
+          <a:off x="0" y="0"/>
+          <a:ext cx="0" cy="0"/>
+          <a:chOff x="0" y="0"/>
+          <a:chExt cx="0" cy="0"/>
+        </a:xfrm>
+      </p:grpSpPr>
+      <p:sp>
+        <p:nvSpPr>
+          <p:cNvPr id="139" name="CustomShape 1"/>
+          <p:cNvSpPr/>
+          <p:nvPr/>
+        </p:nvSpPr>
+        <p:spPr>
+          <a:xfrm>
+            <a:off x="504360" y="301320"/>
+            <a:ext cx="9070920" cy="1261440"/>
+          </a:xfrm>
+          <a:prstGeom prst="rect">
+            <a:avLst/>
+          </a:prstGeom>
+          <a:noFill/>
+          <a:ln>
+            <a:noFill/>
+          </a:ln>
+        </p:spPr>
+        <p:txBody>
+          <a:bodyPr lIns="0" rIns="0" tIns="0" bIns="0" anchor="ctr"/>
+          <a:p>
+            <a:pPr algn="ctr">
+              <a:lnSpc>
+                <a:spcPct val="100000"/>
+              </a:lnSpc>
+              <a:buSzPct val="45000"/>
+              <a:buFont typeface="StarSymbol"/>
+              <a:buChar char="l"/>
+            </a:pPr>
+            <a:r>
+              <a:rPr lang="en-IE" sz="4400">
+                <a:latin typeface="Arial"/>
+                <a:ea typeface="宋体"/>
+              </a:rPr>
+              <a:t>Copyright</a:t>
+            </a:r>
+            <a:endParaRPr/>
+          </a:p>
+        </p:txBody>
+      </p:sp>
+      <p:sp>
+        <p:nvSpPr>
+          <p:cNvPr id="140" name="CustomShape 2"/>
+          <p:cNvSpPr/>
+          <p:nvPr/>
+        </p:nvSpPr>
+        <p:spPr>
+          <a:xfrm>
+            <a:off x="720360" y="1978920"/>
+            <a:ext cx="8712360" cy="4173840"/>
+          </a:xfrm>
+          <a:prstGeom prst="rect">
+            <a:avLst/>
+          </a:prstGeom>
+          <a:noFill/>
+          <a:ln>
+            <a:noFill/>
+          </a:ln>
+        </p:spPr>
+        <p:txBody>
+          <a:bodyPr lIns="0" rIns="0" tIns="0" bIns="0"/>
+          <a:p>
+            <a:pPr>
+              <a:lnSpc>
+                <a:spcPct val="100000"/>
+              </a:lnSpc>
+            </a:pPr>
+            <a:r>
+              <a:rPr lang="en-IE" sz="3200">
+                <a:latin typeface="Arial"/>
+                <a:ea typeface="宋体"/>
+              </a:rPr>
+              <a:t>Features of copyright :</a:t>
+            </a:r>
+            <a:endParaRPr/>
+          </a:p>
+          <a:p>
+            <a:pPr>
+              <a:lnSpc>
+                <a:spcPct val="100000"/>
+              </a:lnSpc>
+            </a:pPr>
+            <a:endParaRPr/>
+          </a:p>
+          <a:p>
+            <a:pPr>
+              <a:lnSpc>
+                <a:spcPct val="100000"/>
+              </a:lnSpc>
+              <a:buSzPct val="25000"/>
+              <a:buFont typeface="Wingdings" charset="2"/>
+              <a:buChar char=""/>
+            </a:pPr>
+            <a:r>
+              <a:rPr lang="en-IE" sz="3200">
+                <a:latin typeface="Arial"/>
+                <a:ea typeface="宋体"/>
+              </a:rPr>
+              <a:t>Made upon creation</a:t>
+            </a:r>
+            <a:endParaRPr/>
+          </a:p>
+          <a:p>
+            <a:pPr>
+              <a:lnSpc>
+                <a:spcPct val="100000"/>
+              </a:lnSpc>
+            </a:pPr>
+            <a:endParaRPr/>
+          </a:p>
+          <a:p>
+            <a:pPr>
+              <a:lnSpc>
+                <a:spcPct val="100000"/>
+              </a:lnSpc>
+            </a:pPr>
+            <a:r>
+              <a:rPr lang="en-IE" sz="3200">
+                <a:latin typeface="Arial"/>
+                <a:ea typeface="宋体"/>
+              </a:rPr>
+              <a:t>    </a:t>
+            </a:r>
+            <a:r>
+              <a:rPr lang="en-IE" sz="3200">
+                <a:latin typeface="Arial"/>
+                <a:ea typeface="宋体"/>
+              </a:rPr>
+              <a:t>Applying is unnecessary</a:t>
+            </a:r>
+            <a:endParaRPr/>
+          </a:p>
+          <a:p>
+            <a:pPr>
+              <a:lnSpc>
+                <a:spcPct val="100000"/>
+              </a:lnSpc>
+            </a:pPr>
+            <a:endParaRPr/>
+          </a:p>
+          <a:p>
+            <a:pPr>
+              <a:lnSpc>
+                <a:spcPct val="100000"/>
+              </a:lnSpc>
+              <a:buSzPct val="25000"/>
+              <a:buFont typeface="Wingdings" charset="2"/>
+              <a:buChar char=""/>
+            </a:pPr>
+            <a:r>
+              <a:rPr lang="en-IE" sz="3200">
+                <a:latin typeface="Arial"/>
+                <a:ea typeface="宋体"/>
+              </a:rPr>
+              <a:t>Copyright protection is lifelong</a:t>
+            </a:r>
+            <a:endParaRPr/>
+          </a:p>
+        </p:txBody>
+      </p:sp>
+    </p:spTree>
+  </p:cSld>
+  <p:timing>
+    <p:tnLst>
+      <p:par>
+        <p:cTn id="21" dur="indefinite" restart="never" nodeType="tmRoot">
+          <p:childTnLst>
+            <p:seq>
+              <p:cTn id="22" nodeType="mainSeq"/>
+              <p:prevCondLst>
+                <p:cond delay="0" evt="onPrev">
+                  <p:tgtEl>
+                    <p:sldTgt/>
+                  </p:tgtEl>
+                </p:cond>
+              </p:prevCondLst>
+              <p:nextCondLst>
+                <p:cond delay="0" evt="onNext">
+                  <p:tgtEl>
+                    <p:sldTgt/>
+                  </p:tgtEl>
+                </p:cond>
+              </p:nextCondLst>
+            </p:seq>
+          </p:childTnLst>
+        </p:cTn>
+      </p:par>
+    </p:tnLst>
+  </p:timing>
+</p:sld>
+</file>
+
+<file path=ppt/slides/slide12.xml><?xml version="1.0" encoding="utf-8"?>
+<p:sld xmlns:a="http://schemas.openxmlformats.org/drawingml/2006/main" xmlns:p="http://schemas.openxmlformats.org/presentationml/2006/main" xmlns:r="http://schemas.openxmlformats.org/officeDocument/2006/relationships">
+  <p:cSld>
+    <p:spTree>
+      <p:nvGrpSpPr>
+        <p:cNvPr id="1" name=""/>
+        <p:cNvGrpSpPr/>
+        <p:nvPr/>
+      </p:nvGrpSpPr>
+      <p:grpSpPr>
+        <a:xfrm>
+          <a:off x="0" y="0"/>
+          <a:ext cx="0" cy="0"/>
+          <a:chOff x="0" y="0"/>
+          <a:chExt cx="0" cy="0"/>
+        </a:xfrm>
+      </p:grpSpPr>
+      <p:sp>
+        <p:nvSpPr>
+          <p:cNvPr id="141" name="CustomShape 1"/>
+          <p:cNvSpPr/>
+          <p:nvPr/>
+        </p:nvSpPr>
+        <p:spPr>
+          <a:xfrm>
+            <a:off x="504000" y="301320"/>
+            <a:ext cx="9069840" cy="1260000"/>
+          </a:xfrm>
+          <a:prstGeom prst="rect">
+            <a:avLst/>
+          </a:prstGeom>
+          <a:noFill/>
+          <a:ln>
+            <a:noFill/>
+          </a:ln>
+        </p:spPr>
+        <p:txBody>
+          <a:bodyPr lIns="0" rIns="0" tIns="0" bIns="0" anchor="ctr"/>
+          <a:p>
+            <a:pPr algn="ctr">
+              <a:lnSpc>
+                <a:spcPct val="100000"/>
+              </a:lnSpc>
+            </a:pPr>
+            <a:r>
+              <a:rPr lang="en-IE" sz="4400">
+                <a:latin typeface="Arial"/>
+              </a:rPr>
+              <a:t>Trade Secret</a:t>
+            </a:r>
+            <a:endParaRPr/>
+          </a:p>
+        </p:txBody>
+      </p:sp>
+      <p:sp>
+        <p:nvSpPr>
+          <p:cNvPr id="142" name="CustomShape 2"/>
+          <p:cNvSpPr/>
+          <p:nvPr/>
+        </p:nvSpPr>
+        <p:spPr>
+          <a:xfrm>
+            <a:off x="504000" y="1768680"/>
+            <a:ext cx="9069840" cy="4381920"/>
+          </a:xfrm>
+          <a:prstGeom prst="rect">
+            <a:avLst/>
+          </a:prstGeom>
+          <a:noFill/>
+          <a:ln>
+            <a:noFill/>
+          </a:ln>
+        </p:spPr>
+        <p:txBody>
+          <a:bodyPr lIns="0" rIns="0" tIns="0" bIns="0"/>
+          <a:p>
+            <a:pPr>
+              <a:lnSpc>
+                <a:spcPct val="100000"/>
+              </a:lnSpc>
+            </a:pPr>
+            <a:endParaRPr/>
+          </a:p>
+          <a:p>
+            <a:pPr>
+              <a:lnSpc>
+                <a:spcPct val="100000"/>
+              </a:lnSpc>
+              <a:buFont typeface="Wingdings" charset="2"/>
+              <a:buChar char=""/>
+            </a:pPr>
+            <a:r>
+              <a:rPr lang="en-IE" sz="3200">
+                <a:latin typeface="Arial"/>
+              </a:rPr>
+              <a:t>Any formula, pattern, process, tool or mechanism</a:t>
+            </a:r>
+            <a:endParaRPr/>
+          </a:p>
+          <a:p>
+            <a:pPr>
+              <a:lnSpc>
+                <a:spcPct val="100000"/>
+              </a:lnSpc>
+            </a:pPr>
+            <a:endParaRPr/>
+          </a:p>
+          <a:p>
+            <a:pPr>
+              <a:lnSpc>
+                <a:spcPct val="100000"/>
+              </a:lnSpc>
+              <a:buFont typeface="Wingdings" charset="2"/>
+              <a:buChar char=""/>
+            </a:pPr>
+            <a:r>
+              <a:rPr lang="en-IE" sz="3200">
+                <a:latin typeface="Arial"/>
+              </a:rPr>
+              <a:t>Theoretically lasts forever</a:t>
+            </a:r>
+            <a:endParaRPr/>
+          </a:p>
+          <a:p>
+            <a:pPr>
+              <a:lnSpc>
+                <a:spcPct val="100000"/>
+              </a:lnSpc>
+            </a:pPr>
+            <a:endParaRPr/>
+          </a:p>
+          <a:p>
+            <a:pPr>
+              <a:lnSpc>
+                <a:spcPct val="100000"/>
+              </a:lnSpc>
+              <a:buFont typeface="Wingdings" charset="2"/>
+              <a:buChar char=""/>
+            </a:pPr>
+            <a:r>
+              <a:rPr lang="en-IE" sz="3200">
+                <a:latin typeface="Arial"/>
+              </a:rPr>
+              <a:t>Subject to theft and not “infringement”</a:t>
+            </a:r>
+            <a:endParaRPr/>
+          </a:p>
+          <a:p>
+            <a:pPr>
+              <a:lnSpc>
+                <a:spcPct val="100000"/>
+              </a:lnSpc>
+            </a:pPr>
+            <a:endParaRPr/>
+          </a:p>
+        </p:txBody>
+      </p:sp>
+    </p:spTree>
+  </p:cSld>
+  <p:timing>
+    <p:tnLst>
+      <p:par>
+        <p:cTn id="23" dur="indefinite" restart="never" nodeType="tmRoot">
+          <p:childTnLst>
+            <p:seq>
+              <p:cTn id="24" nodeType="mainSeq"/>
+              <p:prevCondLst>
+                <p:cond delay="0" evt="onPrev">
+                  <p:tgtEl>
+                    <p:sldTgt/>
+                  </p:tgtEl>
+                </p:cond>
+              </p:prevCondLst>
+              <p:nextCondLst>
+                <p:cond delay="0" evt="onNext">
+                  <p:tgtEl>
+                    <p:sldTgt/>
+                  </p:tgtEl>
+                </p:cond>
+              </p:nextCondLst>
+            </p:seq>
+          </p:childTnLst>
+        </p:cTn>
+      </p:par>
+    </p:tnLst>
+  </p:timing>
+</p:sld>
+</file>
+
+<file path=ppt/slides/slide13.xml><?xml version="1.0" encoding="utf-8"?>
+<p:sld xmlns:a="http://schemas.openxmlformats.org/drawingml/2006/main" xmlns:p="http://schemas.openxmlformats.org/presentationml/2006/main" xmlns:r="http://schemas.openxmlformats.org/officeDocument/2006/relationships">
+  <p:cSld>
+    <p:spTree>
+      <p:nvGrpSpPr>
+        <p:cNvPr id="1" name=""/>
+        <p:cNvGrpSpPr/>
+        <p:nvPr/>
+      </p:nvGrpSpPr>
+      <p:grpSpPr>
+        <a:xfrm>
+          <a:off x="0" y="0"/>
+          <a:ext cx="0" cy="0"/>
+          <a:chOff x="0" y="0"/>
+          <a:chExt cx="0" cy="0"/>
+        </a:xfrm>
+      </p:grpSpPr>
+      <p:sp>
+        <p:nvSpPr>
+          <p:cNvPr id="143" name="CustomShape 1"/>
+          <p:cNvSpPr/>
+          <p:nvPr/>
+        </p:nvSpPr>
+        <p:spPr>
+          <a:xfrm>
+            <a:off x="504000" y="301320"/>
+            <a:ext cx="9069840" cy="1260000"/>
+          </a:xfrm>
+          <a:prstGeom prst="rect">
+            <a:avLst/>
+          </a:prstGeom>
+          <a:noFill/>
+          <a:ln>
+            <a:noFill/>
+          </a:ln>
+        </p:spPr>
+        <p:txBody>
+          <a:bodyPr lIns="0" rIns="0" tIns="0" bIns="0" anchor="ctr"/>
+          <a:p>
+            <a:pPr algn="ctr">
+              <a:lnSpc>
+                <a:spcPct val="100000"/>
+              </a:lnSpc>
+            </a:pPr>
+            <a:r>
+              <a:rPr lang="en-IE" sz="4400">
+                <a:latin typeface="Arial"/>
+              </a:rPr>
+              <a:t>Conclusion</a:t>
+            </a:r>
+            <a:endParaRPr/>
+          </a:p>
+        </p:txBody>
+      </p:sp>
+      <p:sp>
+        <p:nvSpPr>
+          <p:cNvPr id="144" name="CustomShape 2"/>
+          <p:cNvSpPr/>
+          <p:nvPr/>
+        </p:nvSpPr>
+        <p:spPr>
+          <a:xfrm>
+            <a:off x="504000" y="1768680"/>
+            <a:ext cx="9069840" cy="4381920"/>
+          </a:xfrm>
+          <a:prstGeom prst="rect">
+            <a:avLst/>
+          </a:prstGeom>
+          <a:noFill/>
+          <a:ln>
+            <a:noFill/>
+          </a:ln>
+        </p:spPr>
+        <p:txBody>
+          <a:bodyPr lIns="0" rIns="0" tIns="0" bIns="0"/>
+          <a:p>
+            <a:pPr>
+              <a:lnSpc>
+                <a:spcPct val="100000"/>
+              </a:lnSpc>
+            </a:pPr>
+            <a:endParaRPr/>
+          </a:p>
+          <a:p>
+            <a:pPr>
+              <a:lnSpc>
+                <a:spcPct val="100000"/>
+              </a:lnSpc>
+              <a:buFont typeface="Wingdings" charset="2"/>
+              <a:buChar char=""/>
+            </a:pPr>
+            <a:r>
+              <a:rPr lang="en-IE" sz="3200">
+                <a:latin typeface="Arial"/>
+              </a:rPr>
+              <a:t>Intellectual properties are important!</a:t>
+            </a:r>
+            <a:endParaRPr/>
+          </a:p>
+          <a:p>
+            <a:pPr>
+              <a:lnSpc>
+                <a:spcPct val="100000"/>
+              </a:lnSpc>
+            </a:pPr>
+            <a:endParaRPr/>
+          </a:p>
+          <a:p>
+            <a:pPr>
+              <a:lnSpc>
+                <a:spcPct val="100000"/>
+              </a:lnSpc>
+              <a:buFont typeface="Wingdings" charset="2"/>
+              <a:buChar char=""/>
+            </a:pPr>
+            <a:r>
+              <a:rPr lang="en-IE" sz="3200">
+                <a:latin typeface="Arial"/>
+              </a:rPr>
+              <a:t>Take caution with your projects!</a:t>
+            </a:r>
+            <a:endParaRPr/>
+          </a:p>
+          <a:p>
+            <a:pPr>
+              <a:lnSpc>
+                <a:spcPct val="100000"/>
+              </a:lnSpc>
+            </a:pPr>
+            <a:endParaRPr/>
+          </a:p>
+          <a:p>
+            <a:pPr>
+              <a:lnSpc>
+                <a:spcPct val="100000"/>
+              </a:lnSpc>
+              <a:buFont typeface="Wingdings" charset="2"/>
+              <a:buChar char=""/>
+            </a:pPr>
+            <a:r>
+              <a:rPr lang="en-IE" sz="3200">
+                <a:latin typeface="Arial"/>
+              </a:rPr>
+              <a:t>Protect your hard work!</a:t>
+            </a:r>
+            <a:endParaRPr/>
+          </a:p>
+        </p:txBody>
+      </p:sp>
+    </p:spTree>
+  </p:cSld>
+  <p:timing>
+    <p:tnLst>
+      <p:par>
+        <p:cTn id="25" dur="indefinite" restart="never" nodeType="tmRoot">
+          <p:childTnLst>
+            <p:seq>
+              <p:cTn id="26" nodeType="mainSeq"/>
+              <p:prevCondLst>
+                <p:cond delay="0" evt="onPrev">
+                  <p:tgtEl>
+                    <p:sldTgt/>
+                  </p:tgtEl>
+                </p:cond>
+              </p:prevCondLst>
+              <p:nextCondLst>
+                <p:cond delay="0" evt="onNext">
+                  <p:tgtEl>
+                    <p:sldTgt/>
+                  </p:tgtEl>
+                </p:cond>
+              </p:nextCondLst>
+            </p:seq>
+          </p:childTnLst>
+        </p:cTn>
+      </p:par>
+    </p:tnLst>
+  </p:timing>
+</p:sld>
+</file>
+
+<file path=ppt/slides/slide14.xml><?xml version="1.0" encoding="utf-8"?>
+<p:sld xmlns:a="http://schemas.openxmlformats.org/drawingml/2006/main" xmlns:p="http://schemas.openxmlformats.org/presentationml/2006/main" xmlns:r="http://schemas.openxmlformats.org/officeDocument/2006/relationships">
+  <p:cSld>
+    <p:spTree>
+      <p:nvGrpSpPr>
+        <p:cNvPr id="1" name=""/>
+        <p:cNvGrpSpPr/>
+        <p:nvPr/>
+      </p:nvGrpSpPr>
+      <p:grpSpPr>
+        <a:xfrm>
+          <a:off x="0" y="0"/>
+          <a:ext cx="0" cy="0"/>
+          <a:chOff x="0" y="0"/>
+          <a:chExt cx="0" cy="0"/>
+        </a:xfrm>
+      </p:grpSpPr>
+      <p:sp>
+        <p:nvSpPr>
+          <p:cNvPr id="145" name="CustomShape 1"/>
+          <p:cNvSpPr/>
+          <p:nvPr/>
+        </p:nvSpPr>
+        <p:spPr>
+          <a:xfrm>
+            <a:off x="504000" y="301320"/>
+            <a:ext cx="9069840" cy="1260000"/>
+          </a:xfrm>
+          <a:prstGeom prst="rect">
+            <a:avLst/>
+          </a:prstGeom>
+          <a:noFill/>
+          <a:ln>
+            <a:noFill/>
+          </a:ln>
+        </p:spPr>
+      </p:sp>
+      <p:sp>
+        <p:nvSpPr>
+          <p:cNvPr id="146" name="CustomShape 2"/>
+          <p:cNvSpPr/>
+          <p:nvPr/>
+        </p:nvSpPr>
+        <p:spPr>
+          <a:xfrm>
+            <a:off x="504000" y="1768680"/>
+            <a:ext cx="9069840" cy="4381920"/>
+          </a:xfrm>
+          <a:prstGeom prst="rect">
+            <a:avLst/>
+          </a:prstGeom>
+          <a:noFill/>
+          <a:ln>
+            <a:noFill/>
+          </a:ln>
+        </p:spPr>
+        <p:txBody>
+          <a:bodyPr lIns="0" rIns="0" tIns="0" bIns="0"/>
+          <a:p>
+            <a:pPr algn="ctr">
+              <a:lnSpc>
+                <a:spcPct val="100000"/>
+              </a:lnSpc>
+            </a:pPr>
+            <a:endParaRPr/>
+          </a:p>
+          <a:p>
+            <a:pPr algn="ctr">
+              <a:lnSpc>
+                <a:spcPct val="100000"/>
+              </a:lnSpc>
+            </a:pPr>
+            <a:endParaRPr/>
+          </a:p>
+          <a:p>
+            <a:pPr algn="ctr">
+              <a:lnSpc>
+                <a:spcPct val="100000"/>
+              </a:lnSpc>
+            </a:pPr>
+            <a:endParaRPr/>
+          </a:p>
+          <a:p>
+            <a:pPr algn="ctr">
+              <a:lnSpc>
+                <a:spcPct val="100000"/>
+              </a:lnSpc>
+            </a:pPr>
+            <a:r>
+              <a:rPr lang="en-IE" sz="4400">
+                <a:latin typeface="Arial"/>
+              </a:rPr>
+              <a:t>Questions?</a:t>
+            </a:r>
+            <a:endParaRPr/>
+          </a:p>
+        </p:txBody>
+      </p:sp>
+    </p:spTree>
+  </p:cSld>
+  <p:timing>
+    <p:tnLst>
+      <p:par>
+        <p:cTn id="27" dur="indefinite" restart="never" nodeType="tmRoot">
+          <p:childTnLst>
+            <p:seq>
+              <p:cTn id="28" nodeType="mainSeq"/>
+              <p:prevCondLst>
+                <p:cond delay="0" evt="onPrev">
+                  <p:tgtEl>
+                    <p:sldTgt/>
+                  </p:tgtEl>
+                </p:cond>
+              </p:prevCondLst>
+              <p:nextCondLst>
+                <p:cond delay="0" evt="onNext">
+                  <p:tgtEl>
+                    <p:sldTgt/>
+                  </p:tgtEl>
+                </p:cond>
+              </p:nextCondLst>
+            </p:seq>
+          </p:childTnLst>
+        </p:cTn>
+      </p:par>
+    </p:tnLst>
+  </p:timing>
+</p:sld>
+</file>
+
+<file path=ppt/slides/slide2.xml><?xml version="1.0" encoding="utf-8"?>
+<p:sld xmlns:a="http://schemas.openxmlformats.org/drawingml/2006/main" xmlns:p="http://schemas.openxmlformats.org/presentationml/2006/main" xmlns:r="http://schemas.openxmlformats.org/officeDocument/2006/relationships">
+  <p:cSld>
+    <p:spTree>
+      <p:nvGrpSpPr>
+        <p:cNvPr id="1" name=""/>
+        <p:cNvGrpSpPr/>
+        <p:nvPr/>
+      </p:nvGrpSpPr>
+      <p:grpSpPr>
+        <a:xfrm>
+          <a:off x="0" y="0"/>
+          <a:ext cx="0" cy="0"/>
+          <a:chOff x="0" y="0"/>
+          <a:chExt cx="0" cy="0"/>
+        </a:xfrm>
+      </p:grpSpPr>
+      <p:sp>
+        <p:nvSpPr>
+          <p:cNvPr id="114" name="CustomShape 1"/>
+          <p:cNvSpPr/>
+          <p:nvPr/>
+        </p:nvSpPr>
+        <p:spPr>
+          <a:xfrm>
+            <a:off x="504000" y="301320"/>
+            <a:ext cx="9069840" cy="1259640"/>
+          </a:xfrm>
+          <a:prstGeom prst="rect">
+            <a:avLst/>
+          </a:prstGeom>
+          <a:noFill/>
+          <a:ln>
+            <a:noFill/>
+          </a:ln>
+        </p:spPr>
+        <p:txBody>
+          <a:bodyPr lIns="0" rIns="0" tIns="0" bIns="0" anchor="ctr"/>
+          <a:p>
+            <a:pPr algn="ctr">
+              <a:lnSpc>
+                <a:spcPct val="100000"/>
+              </a:lnSpc>
+            </a:pPr>
+            <a:r>
+              <a:rPr lang="en-IE" sz="4400">
+                <a:solidFill>
+                  <a:srgbClr val="000000"/>
+                </a:solidFill>
+                <a:latin typeface="Arial"/>
+                <a:ea typeface="DejaVu Sans"/>
+              </a:rPr>
+              <a:t> </a:t>
+            </a:r>
+            <a:endParaRPr/>
+          </a:p>
+        </p:txBody>
+      </p:sp>
+      <p:sp>
+        <p:nvSpPr>
+          <p:cNvPr id="115" name="CustomShape 2"/>
+          <p:cNvSpPr/>
+          <p:nvPr/>
+        </p:nvSpPr>
+        <p:spPr>
+          <a:xfrm>
+            <a:off x="504000" y="1768680"/>
+            <a:ext cx="9069840" cy="4381920"/>
+          </a:xfrm>
+          <a:prstGeom prst="rect">
+            <a:avLst/>
+          </a:prstGeom>
+          <a:noFill/>
+          <a:ln>
+            <a:noFill/>
+          </a:ln>
+        </p:spPr>
+        <p:txBody>
+          <a:bodyPr lIns="0" rIns="0" tIns="0" bIns="0"/>
+          <a:p>
+            <a:pPr algn="ctr">
+              <a:lnSpc>
+                <a:spcPct val="100000"/>
+              </a:lnSpc>
+            </a:pPr>
+            <a:r>
+              <a:rPr lang="en-IE" sz="5400">
+                <a:solidFill>
+                  <a:srgbClr val="000000"/>
+                </a:solidFill>
+                <a:latin typeface="Arial"/>
+                <a:ea typeface="DejaVu Sans"/>
+              </a:rPr>
+              <a:t>Intellectual Properties </a:t>
+            </a:r>
+            <a:endParaRPr/>
+          </a:p>
+          <a:p>
+            <a:pPr algn="ctr">
+              <a:lnSpc>
+                <a:spcPct val="100000"/>
+              </a:lnSpc>
+            </a:pPr>
+            <a:r>
+              <a:rPr lang="en-IE" sz="5400">
+                <a:solidFill>
+                  <a:srgbClr val="000000"/>
+                </a:solidFill>
+                <a:latin typeface="Arial"/>
+                <a:ea typeface="DejaVu Sans"/>
+              </a:rPr>
+              <a:t>Found in a Software Application</a:t>
+            </a:r>
+            <a:endParaRPr/>
+          </a:p>
+        </p:txBody>
+      </p:sp>
+    </p:spTree>
+  </p:cSld>
+  <p:timing>
+    <p:tnLst>
+      <p:par>
+        <p:cTn id="3" dur="indefinite" restart="never" nodeType="tmRoot">
+          <p:childTnLst>
+            <p:seq>
+              <p:cTn id="4" nodeType="mainSeq"/>
+              <p:prevCondLst>
+                <p:cond delay="0" evt="onPrev">
+                  <p:tgtEl>
+                    <p:sldTgt/>
+                  </p:tgtEl>
+                </p:cond>
+              </p:prevCondLst>
+              <p:nextCondLst>
+                <p:cond delay="0" evt="onNext">
+                  <p:tgtEl>
+                    <p:sldTgt/>
+                  </p:tgtEl>
+                </p:cond>
+              </p:nextCondLst>
+            </p:seq>
+          </p:childTnLst>
+        </p:cTn>
+      </p:par>
+    </p:tnLst>
+  </p:timing>
+</p:sld>
+</file>
+
+<file path=ppt/slides/slide3.xml><?xml version="1.0" encoding="utf-8"?>
+<p:sld xmlns:a="http://schemas.openxmlformats.org/drawingml/2006/main" xmlns:p="http://schemas.openxmlformats.org/presentationml/2006/main" xmlns:r="http://schemas.openxmlformats.org/officeDocument/2006/relationships">
+  <p:cSld>
+    <p:spTree>
+      <p:nvGrpSpPr>
+        <p:cNvPr id="1" name=""/>
+        <p:cNvGrpSpPr/>
+        <p:nvPr/>
+      </p:nvGrpSpPr>
+      <p:grpSpPr>
+        <a:xfrm>
+          <a:off x="0" y="0"/>
+          <a:ext cx="0" cy="0"/>
+          <a:chOff x="0" y="0"/>
+          <a:chExt cx="0" cy="0"/>
+        </a:xfrm>
+      </p:grpSpPr>
+      <p:sp>
+        <p:nvSpPr>
+          <p:cNvPr id="116" name="CustomShape 1"/>
+          <p:cNvSpPr/>
+          <p:nvPr/>
+        </p:nvSpPr>
+        <p:spPr>
+          <a:xfrm>
+            <a:off x="504000" y="301320"/>
+            <a:ext cx="9069840" cy="1260000"/>
+          </a:xfrm>
+          <a:prstGeom prst="rect">
+            <a:avLst/>
+          </a:prstGeom>
+          <a:noFill/>
+          <a:ln>
+            <a:noFill/>
+          </a:ln>
+        </p:spPr>
+        <p:txBody>
+          <a:bodyPr lIns="0" rIns="0" tIns="0" bIns="0" anchor="ctr"/>
+          <a:p>
+            <a:pPr algn="ctr">
+              <a:lnSpc>
+                <a:spcPct val="100000"/>
+              </a:lnSpc>
+            </a:pPr>
+            <a:r>
+              <a:rPr lang="en-IE" sz="4400">
+                <a:latin typeface="Arial"/>
+              </a:rPr>
+              <a:t>Types</a:t>
+            </a:r>
+            <a:endParaRPr/>
+          </a:p>
+        </p:txBody>
+      </p:sp>
+      <p:sp>
+        <p:nvSpPr>
+          <p:cNvPr id="117" name="CustomShape 2"/>
+          <p:cNvSpPr/>
+          <p:nvPr/>
+        </p:nvSpPr>
+        <p:spPr>
+          <a:xfrm>
+            <a:off x="504000" y="1768680"/>
+            <a:ext cx="9069840" cy="4381920"/>
+          </a:xfrm>
+          <a:prstGeom prst="rect">
+            <a:avLst/>
+          </a:prstGeom>
+          <a:noFill/>
+          <a:ln>
+            <a:noFill/>
+          </a:ln>
+        </p:spPr>
+        <p:txBody>
+          <a:bodyPr lIns="0" rIns="0" tIns="0" bIns="0"/>
+          <a:p>
+            <a:endParaRPr/>
+          </a:p>
+          <a:p>
+            <a:r>
+              <a:rPr lang="en-IE" sz="3200">
+                <a:latin typeface="Arial"/>
+              </a:rPr>
+              <a:t>Foundation of software industry</a:t>
+            </a:r>
+            <a:endParaRPr/>
+          </a:p>
+          <a:p>
+            <a:endParaRPr/>
+          </a:p>
+          <a:p>
+            <a:r>
+              <a:rPr lang="en-IE" sz="3200">
+                <a:latin typeface="Arial"/>
+              </a:rPr>
+              <a:t>Intellectual properties found in software:</a:t>
+            </a:r>
+            <a:endParaRPr/>
+          </a:p>
+          <a:p>
+            <a:pPr>
+              <a:lnSpc>
+                <a:spcPct val="100000"/>
+              </a:lnSpc>
+              <a:buFont typeface="Wingdings" charset="2"/>
+              <a:buChar char=""/>
+            </a:pPr>
+            <a:r>
+              <a:rPr lang="en-IE" sz="3200">
+                <a:latin typeface="Arial"/>
+              </a:rPr>
+              <a:t>Patents</a:t>
+            </a:r>
+            <a:endParaRPr/>
+          </a:p>
+          <a:p>
+            <a:pPr>
+              <a:lnSpc>
+                <a:spcPct val="100000"/>
+              </a:lnSpc>
+              <a:buFont typeface="Wingdings" charset="2"/>
+              <a:buChar char=""/>
+            </a:pPr>
+            <a:r>
+              <a:rPr lang="en-IE" sz="3200">
+                <a:latin typeface="Arial"/>
+              </a:rPr>
+              <a:t>Copyrights</a:t>
+            </a:r>
+            <a:endParaRPr/>
+          </a:p>
+          <a:p>
+            <a:pPr>
+              <a:lnSpc>
+                <a:spcPct val="100000"/>
+              </a:lnSpc>
+              <a:buFont typeface="Wingdings" charset="2"/>
+              <a:buChar char=""/>
+            </a:pPr>
+            <a:r>
+              <a:rPr lang="en-IE" sz="3200">
+                <a:latin typeface="Arial"/>
+              </a:rPr>
+              <a:t>Trade Secrets</a:t>
+            </a:r>
+            <a:endParaRPr/>
+          </a:p>
+          <a:p>
+            <a:pPr>
+              <a:lnSpc>
+                <a:spcPct val="100000"/>
+              </a:lnSpc>
+              <a:buFont typeface="Wingdings" charset="2"/>
+              <a:buChar char=""/>
+            </a:pPr>
+            <a:r>
+              <a:rPr lang="en-IE" sz="3200">
+                <a:latin typeface="Arial"/>
+              </a:rPr>
+              <a:t>Trademark</a:t>
+            </a:r>
+            <a:endParaRPr/>
+          </a:p>
+        </p:txBody>
+      </p:sp>
+    </p:spTree>
+  </p:cSld>
+  <p:timing>
+    <p:tnLst>
+      <p:par>
+        <p:cTn id="5" dur="indefinite" restart="never" nodeType="tmRoot">
+          <p:childTnLst>
+            <p:seq>
+              <p:cTn id="6" nodeType="mainSeq"/>
+              <p:prevCondLst>
+                <p:cond delay="0" evt="onPrev">
+                  <p:tgtEl>
+                    <p:sldTgt/>
+                  </p:tgtEl>
+                </p:cond>
+              </p:prevCondLst>
+              <p:nextCondLst>
+                <p:cond delay="0" evt="onNext">
+                  <p:tgtEl>
+                    <p:sldTgt/>
+                  </p:tgtEl>
+                </p:cond>
+              </p:nextCondLst>
+            </p:seq>
+          </p:childTnLst>
+        </p:cTn>
+      </p:par>
+    </p:tnLst>
+  </p:timing>
+</p:sld>
+</file>
+
+<file path=ppt/slides/slide4.xml><?xml version="1.0" encoding="utf-8"?>
+<p:sld xmlns:a="http://schemas.openxmlformats.org/drawingml/2006/main" xmlns:p="http://schemas.openxmlformats.org/presentationml/2006/main" xmlns:r="http://schemas.openxmlformats.org/officeDocument/2006/relationships">
+  <p:cSld>
+    <p:spTree>
+      <p:nvGrpSpPr>
+        <p:cNvPr id="1" name=""/>
+        <p:cNvGrpSpPr/>
+        <p:nvPr/>
+      </p:nvGrpSpPr>
+      <p:grpSpPr>
+        <a:xfrm>
+          <a:off x="0" y="0"/>
+          <a:ext cx="0" cy="0"/>
+          <a:chOff x="0" y="0"/>
+          <a:chExt cx="0" cy="0"/>
+        </a:xfrm>
+      </p:grpSpPr>
+      <p:sp>
+        <p:nvSpPr>
+          <p:cNvPr id="118" name="CustomShape 1"/>
+          <p:cNvSpPr/>
+          <p:nvPr/>
+        </p:nvSpPr>
+        <p:spPr>
+          <a:xfrm>
+            <a:off x="504000" y="301320"/>
+            <a:ext cx="9069840" cy="1260000"/>
+          </a:xfrm>
+          <a:prstGeom prst="rect">
+            <a:avLst/>
+          </a:prstGeom>
+          <a:noFill/>
+          <a:ln>
+            <a:noFill/>
+          </a:ln>
+        </p:spPr>
+        <p:txBody>
+          <a:bodyPr lIns="0" rIns="0" tIns="0" bIns="0" anchor="ctr"/>
+          <a:p>
+            <a:pPr algn="ctr">
+              <a:lnSpc>
+                <a:spcPct val="100000"/>
+              </a:lnSpc>
+            </a:pPr>
+            <a:r>
+              <a:rPr lang="en-IE" sz="4400">
+                <a:latin typeface="Arial"/>
+              </a:rPr>
+              <a:t>Trademark</a:t>
+            </a:r>
+            <a:endParaRPr/>
+          </a:p>
+        </p:txBody>
+      </p:sp>
+      <p:sp>
+        <p:nvSpPr>
+          <p:cNvPr id="119" name="CustomShape 2"/>
+          <p:cNvSpPr/>
+          <p:nvPr/>
+        </p:nvSpPr>
+        <p:spPr>
+          <a:xfrm>
+            <a:off x="504000" y="1768680"/>
+            <a:ext cx="9069840" cy="4381920"/>
+          </a:xfrm>
+          <a:prstGeom prst="rect">
+            <a:avLst/>
+          </a:prstGeom>
+          <a:noFill/>
+          <a:ln>
+            <a:noFill/>
+          </a:ln>
+        </p:spPr>
+        <p:txBody>
+          <a:bodyPr lIns="0" rIns="0" tIns="0" bIns="0"/>
+          <a:p>
+            <a:pPr>
+              <a:lnSpc>
+                <a:spcPct val="100000"/>
+              </a:lnSpc>
+            </a:pPr>
+            <a:endParaRPr/>
+          </a:p>
+          <a:p>
+            <a:pPr>
+              <a:lnSpc>
+                <a:spcPct val="100000"/>
+              </a:lnSpc>
+              <a:buFont typeface="Wingdings" charset="2"/>
+              <a:buChar char=""/>
+            </a:pPr>
+            <a:r>
+              <a:rPr lang="en-IE" sz="3200">
+                <a:latin typeface="Arial"/>
+              </a:rPr>
+              <a:t>Recognizable sign, design or expression</a:t>
+            </a:r>
+            <a:endParaRPr/>
+          </a:p>
+          <a:p>
+            <a:pPr>
+              <a:lnSpc>
+                <a:spcPct val="100000"/>
+              </a:lnSpc>
+            </a:pPr>
+            <a:endParaRPr/>
+          </a:p>
+          <a:p>
+            <a:pPr>
+              <a:lnSpc>
+                <a:spcPct val="100000"/>
+              </a:lnSpc>
+              <a:buFont typeface="Wingdings" charset="2"/>
+              <a:buChar char=""/>
+            </a:pPr>
+            <a:r>
+              <a:rPr lang="en-IE" sz="3200">
+                <a:latin typeface="Arial"/>
+              </a:rPr>
+              <a:t>Patents, copyrights and trade secrets can be used to protect technology itself</a:t>
+            </a:r>
+            <a:endParaRPr/>
+          </a:p>
+          <a:p>
+            <a:pPr>
+              <a:lnSpc>
+                <a:spcPct val="100000"/>
+              </a:lnSpc>
+            </a:pPr>
+            <a:endParaRPr/>
+          </a:p>
+          <a:p>
+            <a:pPr>
+              <a:lnSpc>
+                <a:spcPct val="100000"/>
+              </a:lnSpc>
+              <a:buFont typeface="Wingdings" charset="2"/>
+              <a:buChar char=""/>
+            </a:pPr>
+            <a:r>
+              <a:rPr lang="en-IE" sz="3200">
+                <a:latin typeface="Arial"/>
+              </a:rPr>
+              <a:t>Trademarks do not protect technology</a:t>
+            </a:r>
+            <a:endParaRPr/>
+          </a:p>
+        </p:txBody>
+      </p:sp>
+    </p:spTree>
+  </p:cSld>
+  <p:timing>
+    <p:tnLst>
+      <p:par>
+        <p:cTn id="7" dur="indefinite" restart="never" nodeType="tmRoot">
+          <p:childTnLst>
+            <p:seq>
+              <p:cTn id="8" nodeType="mainSeq"/>
+              <p:prevCondLst>
+                <p:cond delay="0" evt="onPrev">
+                  <p:tgtEl>
+                    <p:sldTgt/>
+                  </p:tgtEl>
+                </p:cond>
+              </p:prevCondLst>
+              <p:nextCondLst>
+                <p:cond delay="0" evt="onNext">
+                  <p:tgtEl>
+                    <p:sldTgt/>
+                  </p:tgtEl>
+                </p:cond>
+              </p:nextCondLst>
+            </p:seq>
+          </p:childTnLst>
+        </p:cTn>
+      </p:par>
+    </p:tnLst>
+  </p:timing>
+</p:sld>
+</file>
+
+<file path=ppt/slides/slide5.xml><?xml version="1.0" encoding="utf-8"?>
+<p:sld xmlns:a="http://schemas.openxmlformats.org/drawingml/2006/main" xmlns:p="http://schemas.openxmlformats.org/presentationml/2006/main" xmlns:r="http://schemas.openxmlformats.org/officeDocument/2006/relationships">
+  <p:cSld>
+    <p:spTree>
+      <p:nvGrpSpPr>
+        <p:cNvPr id="1" name=""/>
+        <p:cNvGrpSpPr/>
+        <p:nvPr/>
+      </p:nvGrpSpPr>
+      <p:grpSpPr>
+        <a:xfrm>
+          <a:off x="0" y="0"/>
+          <a:ext cx="0" cy="0"/>
+          <a:chOff x="0" y="0"/>
+          <a:chExt cx="0" cy="0"/>
+        </a:xfrm>
+      </p:grpSpPr>
+      <p:sp>
+        <p:nvSpPr>
+          <p:cNvPr id="120" name="CustomShape 1"/>
+          <p:cNvSpPr/>
+          <p:nvPr/>
+        </p:nvSpPr>
+        <p:spPr>
+          <a:xfrm>
+            <a:off x="504000" y="301320"/>
+            <a:ext cx="9069840" cy="1260000"/>
+          </a:xfrm>
+          <a:prstGeom prst="rect">
+            <a:avLst/>
+          </a:prstGeom>
+          <a:noFill/>
+          <a:ln>
+            <a:noFill/>
+          </a:ln>
+        </p:spPr>
+        <p:txBody>
+          <a:bodyPr lIns="0" rIns="0" tIns="0" bIns="0" anchor="ctr"/>
+          <a:p>
+            <a:pPr algn="ctr">
+              <a:lnSpc>
+                <a:spcPct val="100000"/>
+              </a:lnSpc>
+            </a:pPr>
+            <a:r>
+              <a:rPr lang="en-IE" sz="4400">
+                <a:latin typeface="Arial"/>
+              </a:rPr>
+              <a:t>Patents</a:t>
+            </a:r>
+            <a:endParaRPr/>
+          </a:p>
+        </p:txBody>
+      </p:sp>
+      <p:sp>
+        <p:nvSpPr>
+          <p:cNvPr id="121" name="CustomShape 2"/>
+          <p:cNvSpPr/>
+          <p:nvPr/>
+        </p:nvSpPr>
+        <p:spPr>
+          <a:xfrm>
+            <a:off x="504000" y="1768680"/>
+            <a:ext cx="9069840" cy="4381920"/>
+          </a:xfrm>
+          <a:prstGeom prst="rect">
+            <a:avLst/>
+          </a:prstGeom>
+          <a:noFill/>
+          <a:ln>
+            <a:noFill/>
+          </a:ln>
+        </p:spPr>
+        <p:txBody>
+          <a:bodyPr lIns="0" rIns="0" tIns="0" bIns="0"/>
+          <a:p>
+            <a:r>
+              <a:rPr lang="en-IE" sz="3200">
+                <a:latin typeface="Arial"/>
+              </a:rPr>
+              <a:t> </a:t>
+            </a:r>
+            <a:endParaRPr/>
+          </a:p>
+          <a:p>
+            <a:pPr>
+              <a:lnSpc>
+                <a:spcPct val="100000"/>
+              </a:lnSpc>
+              <a:buFont typeface="Wingdings" charset="2"/>
+              <a:buChar char=""/>
+            </a:pPr>
+            <a:r>
+              <a:rPr lang="en-IE" sz="3200">
+                <a:latin typeface="Arial"/>
+              </a:rPr>
+              <a:t>Protection of “ideas”</a:t>
+            </a:r>
+            <a:endParaRPr/>
+          </a:p>
+          <a:p>
+            <a:pPr>
+              <a:lnSpc>
+                <a:spcPct val="100000"/>
+              </a:lnSpc>
+            </a:pPr>
+            <a:endParaRPr/>
+          </a:p>
+          <a:p>
+            <a:pPr>
+              <a:lnSpc>
+                <a:spcPct val="100000"/>
+              </a:lnSpc>
+              <a:buFont typeface="Wingdings" charset="2"/>
+              <a:buChar char=""/>
+            </a:pPr>
+            <a:r>
+              <a:rPr lang="en-IE" sz="3200">
+                <a:latin typeface="Arial"/>
+              </a:rPr>
+              <a:t>20 year exclusive monopoly</a:t>
+            </a:r>
+            <a:endParaRPr/>
+          </a:p>
+          <a:p>
+            <a:pPr>
+              <a:lnSpc>
+                <a:spcPct val="100000"/>
+              </a:lnSpc>
+            </a:pPr>
+            <a:endParaRPr/>
+          </a:p>
+          <a:p>
+            <a:pPr>
+              <a:lnSpc>
+                <a:spcPct val="100000"/>
+              </a:lnSpc>
+              <a:buFont typeface="Wingdings" charset="2"/>
+              <a:buChar char=""/>
+            </a:pPr>
+            <a:r>
+              <a:rPr lang="en-IE" sz="3200">
+                <a:latin typeface="Arial"/>
+              </a:rPr>
+              <a:t>Described in detail</a:t>
+            </a:r>
+            <a:endParaRPr/>
+          </a:p>
+          <a:p>
+            <a:pPr>
+              <a:lnSpc>
+                <a:spcPct val="100000"/>
+              </a:lnSpc>
+            </a:pPr>
+            <a:endParaRPr/>
+          </a:p>
+          <a:p>
+            <a:pPr>
+              <a:lnSpc>
+                <a:spcPct val="100000"/>
+              </a:lnSpc>
+              <a:buFont typeface="Wingdings" charset="2"/>
+              <a:buChar char=""/>
+            </a:pPr>
+            <a:r>
+              <a:rPr lang="en-IE" sz="3200">
+                <a:latin typeface="Arial"/>
+              </a:rPr>
+              <a:t>Available to public</a:t>
+            </a:r>
+            <a:endParaRPr/>
+          </a:p>
+        </p:txBody>
+      </p:sp>
+    </p:spTree>
+  </p:cSld>
+  <p:timing>
+    <p:tnLst>
+      <p:par>
+        <p:cTn id="9" dur="indefinite" restart="never" nodeType="tmRoot">
+          <p:childTnLst>
+            <p:seq>
+              <p:cTn id="10" nodeType="mainSeq"/>
+              <p:prevCondLst>
+                <p:cond delay="0" evt="onPrev">
+                  <p:tgtEl>
+                    <p:sldTgt/>
+                  </p:tgtEl>
+                </p:cond>
+              </p:prevCondLst>
+              <p:nextCondLst>
+                <p:cond delay="0" evt="onNext">
+                  <p:tgtEl>
+                    <p:sldTgt/>
+                  </p:tgtEl>
+                </p:cond>
+              </p:nextCondLst>
+            </p:seq>
+          </p:childTnLst>
+        </p:cTn>
+      </p:par>
+    </p:tnLst>
+  </p:timing>
+</p:sld>
+</file>
+
+<file path=ppt/slides/slide6.xml><?xml version="1.0" encoding="utf-8"?>
+<p:sld xmlns:a="http://schemas.openxmlformats.org/drawingml/2006/main" xmlns:p="http://schemas.openxmlformats.org/presentationml/2006/main" xmlns:r="http://schemas.openxmlformats.org/officeDocument/2006/relationships">
+  <p:cSld>
+    <p:spTree>
+      <p:nvGrpSpPr>
+        <p:cNvPr id="1" name=""/>
+        <p:cNvGrpSpPr/>
+        <p:nvPr/>
+      </p:nvGrpSpPr>
+      <p:grpSpPr>
+        <a:xfrm>
+          <a:off x="0" y="0"/>
+          <a:ext cx="0" cy="0"/>
+          <a:chOff x="0" y="0"/>
+          <a:chExt cx="0" cy="0"/>
+        </a:xfrm>
+      </p:grpSpPr>
+      <p:sp>
+        <p:nvSpPr>
+          <p:cNvPr id="122" name="CustomShape 1"/>
+          <p:cNvSpPr/>
+          <p:nvPr/>
+        </p:nvSpPr>
+        <p:spPr>
+          <a:xfrm>
+            <a:off x="504000" y="301320"/>
+            <a:ext cx="9069840" cy="1260000"/>
+          </a:xfrm>
+          <a:prstGeom prst="rect">
+            <a:avLst/>
+          </a:prstGeom>
+          <a:noFill/>
+          <a:ln>
+            <a:noFill/>
+          </a:ln>
+        </p:spPr>
+        <p:txBody>
+          <a:bodyPr lIns="0" rIns="0" tIns="0" bIns="0" anchor="ctr"/>
+          <a:p>
+            <a:pPr algn="ctr">
+              <a:lnSpc>
+                <a:spcPct val="100000"/>
+              </a:lnSpc>
+            </a:pPr>
+            <a:r>
+              <a:rPr lang="en-IE" sz="4400">
+                <a:latin typeface="Arial"/>
+              </a:rPr>
+              <a:t>Obtaining Patents</a:t>
+            </a:r>
+            <a:endParaRPr/>
+          </a:p>
+        </p:txBody>
+      </p:sp>
+      <p:sp>
+        <p:nvSpPr>
+          <p:cNvPr id="123" name="CustomShape 2"/>
+          <p:cNvSpPr/>
+          <p:nvPr/>
+        </p:nvSpPr>
+        <p:spPr>
+          <a:xfrm>
+            <a:off x="504000" y="1768680"/>
+            <a:ext cx="9069840" cy="4381920"/>
+          </a:xfrm>
+          <a:prstGeom prst="rect">
+            <a:avLst/>
+          </a:prstGeom>
+          <a:noFill/>
+          <a:ln>
+            <a:noFill/>
+          </a:ln>
+        </p:spPr>
+        <p:txBody>
+          <a:bodyPr lIns="0" rIns="0" tIns="0" bIns="0"/>
+          <a:p>
+            <a:pPr>
+              <a:lnSpc>
+                <a:spcPct val="100000"/>
+              </a:lnSpc>
+            </a:pPr>
+            <a:endParaRPr/>
+          </a:p>
+          <a:p>
+            <a:pPr>
+              <a:lnSpc>
+                <a:spcPct val="100000"/>
+              </a:lnSpc>
+              <a:buFont typeface="Wingdings" charset="2"/>
+              <a:buChar char=""/>
+            </a:pPr>
+            <a:r>
+              <a:rPr lang="en-IE" sz="3200">
+                <a:latin typeface="Arial"/>
+              </a:rPr>
+              <a:t>Must apply to patent office</a:t>
+            </a:r>
+            <a:endParaRPr/>
+          </a:p>
+          <a:p>
+            <a:pPr>
+              <a:lnSpc>
+                <a:spcPct val="100000"/>
+              </a:lnSpc>
+            </a:pPr>
+            <a:endParaRPr/>
+          </a:p>
+          <a:p>
+            <a:pPr>
+              <a:lnSpc>
+                <a:spcPct val="100000"/>
+              </a:lnSpc>
+              <a:buFont typeface="Wingdings" charset="2"/>
+              <a:buChar char=""/>
+            </a:pPr>
+            <a:r>
+              <a:rPr lang="en-IE" sz="3200">
+                <a:latin typeface="Arial"/>
+              </a:rPr>
+              <a:t>Must be demonstrated as new, useful and “nonobvious”</a:t>
+            </a:r>
+            <a:endParaRPr/>
+          </a:p>
+          <a:p>
+            <a:pPr>
+              <a:lnSpc>
+                <a:spcPct val="100000"/>
+              </a:lnSpc>
+            </a:pPr>
+            <a:endParaRPr/>
+          </a:p>
+          <a:p>
+            <a:pPr>
+              <a:lnSpc>
+                <a:spcPct val="100000"/>
+              </a:lnSpc>
+              <a:buFont typeface="Wingdings" charset="2"/>
+              <a:buChar char=""/>
+            </a:pPr>
+            <a:r>
+              <a:rPr lang="en-IE" sz="3200">
+                <a:latin typeface="Arial"/>
+              </a:rPr>
+              <a:t>More than trivial, obvious next step in the advance of technology</a:t>
+            </a:r>
+            <a:endParaRPr/>
+          </a:p>
+        </p:txBody>
+      </p:sp>
+    </p:spTree>
+  </p:cSld>
+  <p:timing>
+    <p:tnLst>
+      <p:par>
+        <p:cTn id="11" dur="indefinite" restart="never" nodeType="tmRoot">
+          <p:childTnLst>
+            <p:seq>
+              <p:cTn id="12" nodeType="mainSeq"/>
+              <p:prevCondLst>
+                <p:cond delay="0" evt="onPrev">
+                  <p:tgtEl>
+                    <p:sldTgt/>
+                  </p:tgtEl>
+                </p:cond>
+              </p:prevCondLst>
+              <p:nextCondLst>
+                <p:cond delay="0" evt="onNext">
+                  <p:tgtEl>
+                    <p:sldTgt/>
+                  </p:tgtEl>
+                </p:cond>
+              </p:nextCondLst>
+            </p:seq>
+          </p:childTnLst>
+        </p:cTn>
+      </p:par>
+    </p:tnLst>
+  </p:timing>
+</p:sld>
+</file>
+
+<file path=ppt/slides/slide7.xml><?xml version="1.0" encoding="utf-8"?>
+<p:sld xmlns:a="http://schemas.openxmlformats.org/drawingml/2006/main" xmlns:p="http://schemas.openxmlformats.org/presentationml/2006/main" xmlns:r="http://schemas.openxmlformats.org/officeDocument/2006/relationships">
+  <p:cSld>
+    <p:spTree>
+      <p:nvGrpSpPr>
+        <p:cNvPr id="1" name=""/>
+        <p:cNvGrpSpPr/>
+        <p:nvPr/>
+      </p:nvGrpSpPr>
+      <p:grpSpPr>
+        <a:xfrm>
+          <a:off x="0" y="0"/>
+          <a:ext cx="0" cy="0"/>
+          <a:chOff x="0" y="0"/>
+          <a:chExt cx="0" cy="0"/>
+        </a:xfrm>
+      </p:grpSpPr>
+      <p:sp>
+        <p:nvSpPr>
+          <p:cNvPr id="124" name="CustomShape 1"/>
+          <p:cNvSpPr/>
+          <p:nvPr/>
+        </p:nvSpPr>
+        <p:spPr>
+          <a:xfrm>
+            <a:off x="504000" y="301320"/>
+            <a:ext cx="9069840" cy="1260000"/>
+          </a:xfrm>
+          <a:prstGeom prst="rect">
+            <a:avLst/>
+          </a:prstGeom>
+          <a:noFill/>
+          <a:ln>
+            <a:noFill/>
+          </a:ln>
+        </p:spPr>
+        <p:txBody>
+          <a:bodyPr lIns="0" rIns="0" tIns="0" bIns="0" anchor="ctr"/>
+          <a:p>
+            <a:pPr algn="ctr">
+              <a:lnSpc>
+                <a:spcPct val="100000"/>
+              </a:lnSpc>
+            </a:pPr>
+            <a:r>
+              <a:rPr lang="en-IE" sz="4400">
+                <a:latin typeface="Arial"/>
+              </a:rPr>
+              <a:t>Patent examples</a:t>
+            </a:r>
+            <a:endParaRPr/>
+          </a:p>
+        </p:txBody>
+      </p:sp>
+      <p:sp>
+        <p:nvSpPr>
+          <p:cNvPr id="125" name="CustomShape 2"/>
+          <p:cNvSpPr/>
+          <p:nvPr/>
+        </p:nvSpPr>
+        <p:spPr>
+          <a:xfrm>
+            <a:off x="504000" y="1768680"/>
+            <a:ext cx="9069840" cy="4381920"/>
+          </a:xfrm>
+          <a:prstGeom prst="rect">
+            <a:avLst/>
+          </a:prstGeom>
+          <a:noFill/>
+          <a:ln>
+            <a:noFill/>
+          </a:ln>
+        </p:spPr>
+        <p:txBody>
+          <a:bodyPr lIns="0" rIns="0" tIns="0" bIns="0"/>
+          <a:p>
+            <a:pPr>
+              <a:lnSpc>
+                <a:spcPct val="100000"/>
+              </a:lnSpc>
+            </a:pPr>
+            <a:endParaRPr/>
+          </a:p>
+          <a:p>
+            <a:pPr>
+              <a:lnSpc>
+                <a:spcPct val="100000"/>
+              </a:lnSpc>
+              <a:buFont typeface="Wingdings" charset="2"/>
+              <a:buChar char=""/>
+            </a:pPr>
+            <a:r>
+              <a:rPr lang="en-IE" sz="3200">
+                <a:latin typeface="Arial"/>
+              </a:rPr>
+              <a:t>Algorithms, methods, systems</a:t>
+            </a:r>
+            <a:endParaRPr/>
+          </a:p>
+          <a:p>
+            <a:pPr>
+              <a:lnSpc>
+                <a:spcPct val="100000"/>
+              </a:lnSpc>
+            </a:pPr>
+            <a:endParaRPr/>
+          </a:p>
+          <a:p>
+            <a:pPr>
+              <a:lnSpc>
+                <a:spcPct val="100000"/>
+              </a:lnSpc>
+              <a:buFont typeface="Wingdings" charset="2"/>
+              <a:buChar char=""/>
+            </a:pPr>
+            <a:r>
+              <a:rPr lang="en-IE" sz="3200">
+                <a:latin typeface="Arial"/>
+              </a:rPr>
+              <a:t>User-Interface Feature, Menu features</a:t>
+            </a:r>
+            <a:endParaRPr/>
+          </a:p>
+          <a:p>
+            <a:pPr>
+              <a:lnSpc>
+                <a:spcPct val="100000"/>
+              </a:lnSpc>
+            </a:pPr>
+            <a:endParaRPr/>
+          </a:p>
+          <a:p>
+            <a:pPr>
+              <a:lnSpc>
+                <a:spcPct val="100000"/>
+              </a:lnSpc>
+              <a:buFont typeface="Wingdings" charset="2"/>
+              <a:buChar char=""/>
+            </a:pPr>
+            <a:r>
+              <a:rPr lang="en-IE" sz="3200">
+                <a:latin typeface="Arial"/>
+              </a:rPr>
+              <a:t>Apple patents</a:t>
+            </a:r>
+            <a:endParaRPr/>
+          </a:p>
+        </p:txBody>
+      </p:sp>
+      <p:pic>
+        <p:nvPicPr>
+          <p:cNvPr id="126" name="" descr=""/>
+          <p:cNvPicPr/>
+          <p:nvPr/>
+        </p:nvPicPr>
+        <p:blipFill>
+          <a:blip r:embed="rId1"/>
+          <a:stretch>
+            <a:fillRect/>
+          </a:stretch>
+        </p:blipFill>
+        <p:spPr>
+          <a:xfrm>
+            <a:off x="432000" y="4477320"/>
+            <a:ext cx="4836600" cy="2505600"/>
+          </a:xfrm>
+          <a:prstGeom prst="rect">
+            <a:avLst/>
+          </a:prstGeom>
+          <a:ln>
+            <a:noFill/>
+          </a:ln>
+        </p:spPr>
+      </p:pic>
+      <p:pic>
+        <p:nvPicPr>
+          <p:cNvPr id="127" name="" descr=""/>
+          <p:cNvPicPr/>
+          <p:nvPr/>
+        </p:nvPicPr>
+        <p:blipFill>
+          <a:blip r:embed="rId2"/>
+          <a:stretch>
+            <a:fillRect/>
+          </a:stretch>
+        </p:blipFill>
+        <p:spPr>
+          <a:xfrm>
+            <a:off x="5849280" y="4680000"/>
+            <a:ext cx="2285640" cy="2302920"/>
+          </a:xfrm>
+          <a:prstGeom prst="rect">
+            <a:avLst/>
+          </a:prstGeom>
+          <a:ln>
+            <a:noFill/>
+          </a:ln>
+        </p:spPr>
+      </p:pic>
+    </p:spTree>
+  </p:cSld>
+  <p:timing>
+    <p:tnLst>
+      <p:par>
+        <p:cTn id="13" dur="indefinite" restart="never" nodeType="tmRoot">
+          <p:childTnLst>
+            <p:seq>
+              <p:cTn id="14" nodeType="mainSeq"/>
+              <p:prevCondLst>
+                <p:cond delay="0" evt="onPrev">
+                  <p:tgtEl>
+                    <p:sldTgt/>
+                  </p:tgtEl>
+                </p:cond>
+              </p:prevCondLst>
+              <p:nextCondLst>
+                <p:cond delay="0" evt="onNext">
+                  <p:tgtEl>
+                    <p:sldTgt/>
+                  </p:tgtEl>
+                </p:cond>
+              </p:nextCondLst>
+            </p:seq>
+          </p:childTnLst>
+        </p:cTn>
+      </p:par>
+    </p:tnLst>
+  </p:timing>
+</p:sld>
+</file>
+
+<file path=ppt/slides/slide8.xml><?xml version="1.0" encoding="utf-8"?>
+<p:sld xmlns:a="http://schemas.openxmlformats.org/drawingml/2006/main" xmlns:p="http://schemas.openxmlformats.org/presentationml/2006/main" xmlns:r="http://schemas.openxmlformats.org/officeDocument/2006/relationships">
+  <p:cSld>
+    <p:spTree>
+      <p:nvGrpSpPr>
+        <p:cNvPr id="1" name=""/>
+        <p:cNvGrpSpPr/>
+        <p:nvPr/>
+      </p:nvGrpSpPr>
+      <p:grpSpPr>
+        <a:xfrm>
+          <a:off x="0" y="0"/>
+          <a:ext cx="0" cy="0"/>
+          <a:chOff x="0" y="0"/>
+          <a:chExt cx="0" cy="0"/>
+        </a:xfrm>
+      </p:grpSpPr>
+      <p:sp>
+        <p:nvSpPr>
+          <p:cNvPr id="128" name="CustomShape 1"/>
+          <p:cNvSpPr/>
+          <p:nvPr/>
+        </p:nvSpPr>
+        <p:spPr>
+          <a:xfrm>
+            <a:off x="504000" y="301320"/>
+            <a:ext cx="9069840" cy="1260000"/>
+          </a:xfrm>
+          <a:prstGeom prst="rect">
+            <a:avLst/>
+          </a:prstGeom>
+          <a:noFill/>
+          <a:ln>
+            <a:noFill/>
+          </a:ln>
+        </p:spPr>
+        <p:txBody>
+          <a:bodyPr lIns="0" rIns="0" tIns="0" bIns="0" anchor="ctr"/>
+          <a:p>
+            <a:pPr algn="ctr">
+              <a:lnSpc>
+                <a:spcPct val="100000"/>
+              </a:lnSpc>
+            </a:pPr>
+            <a:r>
+              <a:rPr lang="en-IE" sz="4400">
+                <a:latin typeface="Arial"/>
+              </a:rPr>
+              <a:t>Patent examples</a:t>
+            </a:r>
+            <a:endParaRPr/>
+          </a:p>
+        </p:txBody>
+      </p:sp>
+      <p:sp>
+        <p:nvSpPr>
+          <p:cNvPr id="129" name="CustomShape 2"/>
+          <p:cNvSpPr/>
+          <p:nvPr/>
+        </p:nvSpPr>
+        <p:spPr>
+          <a:xfrm>
+            <a:off x="504000" y="1768680"/>
+            <a:ext cx="9069840" cy="4381920"/>
+          </a:xfrm>
+          <a:prstGeom prst="rect">
+            <a:avLst/>
+          </a:prstGeom>
+          <a:noFill/>
+          <a:ln>
+            <a:noFill/>
+          </a:ln>
+        </p:spPr>
+      </p:sp>
+      <p:pic>
+        <p:nvPicPr>
+          <p:cNvPr id="130" name="" descr=""/>
+          <p:cNvPicPr/>
+          <p:nvPr/>
+        </p:nvPicPr>
+        <p:blipFill>
+          <a:blip r:embed="rId1"/>
+          <a:stretch>
+            <a:fillRect/>
+          </a:stretch>
+        </p:blipFill>
+        <p:spPr>
+          <a:xfrm>
+            <a:off x="550440" y="2758680"/>
+            <a:ext cx="2905560" cy="2857320"/>
+          </a:xfrm>
+          <a:prstGeom prst="rect">
+            <a:avLst/>
+          </a:prstGeom>
+          <a:ln>
+            <a:noFill/>
+          </a:ln>
+        </p:spPr>
+      </p:pic>
+      <p:pic>
+        <p:nvPicPr>
+          <p:cNvPr id="131" name="" descr=""/>
+          <p:cNvPicPr/>
+          <p:nvPr/>
+        </p:nvPicPr>
+        <p:blipFill>
+          <a:blip r:embed="rId2"/>
+          <a:stretch>
+            <a:fillRect/>
+          </a:stretch>
+        </p:blipFill>
+        <p:spPr>
+          <a:xfrm>
+            <a:off x="4176000" y="1944000"/>
+            <a:ext cx="5400000" cy="4896000"/>
+          </a:xfrm>
+          <a:prstGeom prst="rect">
+            <a:avLst/>
+          </a:prstGeom>
+          <a:ln>
+            <a:noFill/>
+          </a:ln>
+        </p:spPr>
+      </p:pic>
+    </p:spTree>
+  </p:cSld>
+  <p:timing>
+    <p:tnLst>
+      <p:par>
+        <p:cTn id="15" dur="indefinite" restart="never" nodeType="tmRoot">
+          <p:childTnLst>
+            <p:seq>
+              <p:cTn id="16" nodeType="mainSeq"/>
+              <p:prevCondLst>
+                <p:cond delay="0" evt="onPrev">
+                  <p:tgtEl>
+                    <p:sldTgt/>
+                  </p:tgtEl>
+                </p:cond>
+              </p:prevCondLst>
+              <p:nextCondLst>
+                <p:cond delay="0" evt="onNext">
+                  <p:tgtEl>
+                    <p:sldTgt/>
+                  </p:tgtEl>
+                </p:cond>
+              </p:nextCondLst>
+            </p:seq>
+          </p:childTnLst>
+        </p:cTn>
+      </p:par>
+    </p:tnLst>
+  </p:timing>
+</p:sld>
+</file>
+
+<file path=ppt/slides/slide9.xml><?xml version="1.0" encoding="utf-8"?>
+<p:sld xmlns:a="http://schemas.openxmlformats.org/drawingml/2006/main" xmlns:p="http://schemas.openxmlformats.org/presentationml/2006/main" xmlns:r="http://schemas.openxmlformats.org/officeDocument/2006/relationships">
+  <p:cSld>
+    <p:bg>
+      <p:bgPr>
+        <a:solidFill>
+          <a:srgbClr val="ffffff"/>
+        </a:solidFill>
+      </p:bgPr>
+    </p:bg>
+    <p:spTree>
+      <p:nvGrpSpPr>
+        <p:cNvPr id="1" name=""/>
+        <p:cNvGrpSpPr/>
+        <p:nvPr/>
+      </p:nvGrpSpPr>
+      <p:grpSpPr>
+        <a:xfrm>
+          <a:off x="0" y="0"/>
+          <a:ext cx="0" cy="0"/>
+          <a:chOff x="0" y="0"/>
+          <a:chExt cx="0" cy="0"/>
+        </a:xfrm>
+      </p:grpSpPr>
+      <p:sp>
+        <p:nvSpPr>
+          <p:cNvPr id="132" name="CustomShape 1"/>
+          <p:cNvSpPr/>
+          <p:nvPr/>
+        </p:nvSpPr>
+        <p:spPr>
+          <a:xfrm>
+            <a:off x="504360" y="301320"/>
+            <a:ext cx="9070920" cy="1261440"/>
+          </a:xfrm>
+          <a:prstGeom prst="rect">
+            <a:avLst/>
+          </a:prstGeom>
+          <a:noFill/>
+          <a:ln>
+            <a:noFill/>
+          </a:ln>
+        </p:spPr>
+        <p:txBody>
+          <a:bodyPr lIns="0" rIns="0" tIns="0" bIns="0" anchor="ctr"/>
+          <a:p>
+            <a:pPr algn="ctr">
+              <a:lnSpc>
+                <a:spcPct val="100000"/>
+              </a:lnSpc>
+              <a:buSzPct val="45000"/>
+              <a:buFont typeface="StarSymbol"/>
+              <a:buChar char="l"/>
+            </a:pPr>
+            <a:r>
+              <a:rPr lang="en-IE" sz="4400">
+                <a:latin typeface="Arial"/>
+                <a:ea typeface="宋体"/>
+              </a:rPr>
+              <a:t>Copyright</a:t>
+            </a:r>
+            <a:endParaRPr/>
+          </a:p>
+        </p:txBody>
+      </p:sp>
+      <p:sp>
+        <p:nvSpPr>
+          <p:cNvPr id="133" name="CustomShape 2"/>
+          <p:cNvSpPr/>
+          <p:nvPr/>
+        </p:nvSpPr>
+        <p:spPr>
+          <a:xfrm>
+            <a:off x="504720" y="1767960"/>
+            <a:ext cx="9072720" cy="4963320"/>
+          </a:xfrm>
+          <a:prstGeom prst="rect">
+            <a:avLst/>
+          </a:prstGeom>
+          <a:noFill/>
+          <a:ln>
+            <a:noFill/>
+          </a:ln>
+        </p:spPr>
+        <p:txBody>
+          <a:bodyPr lIns="0" rIns="0" tIns="0" bIns="0"/>
+          <a:p>
+            <a:pPr>
+              <a:lnSpc>
+                <a:spcPct val="80000"/>
+              </a:lnSpc>
+            </a:pPr>
+            <a:endParaRPr/>
+          </a:p>
+          <a:p>
+            <a:pPr>
+              <a:lnSpc>
+                <a:spcPct val="80000"/>
+              </a:lnSpc>
+              <a:buSzPct val="25000"/>
+              <a:buFont typeface="Wingdings" charset="2"/>
+              <a:buChar char=""/>
+            </a:pPr>
+            <a:r>
+              <a:rPr lang="en-IE" sz="2800">
+                <a:latin typeface="Arial"/>
+                <a:ea typeface="宋体"/>
+              </a:rPr>
+              <a:t>What is copyright?</a:t>
+            </a:r>
+            <a:endParaRPr/>
+          </a:p>
+          <a:p>
+            <a:pPr>
+              <a:lnSpc>
+                <a:spcPct val="80000"/>
+              </a:lnSpc>
+            </a:pPr>
+            <a:endParaRPr/>
+          </a:p>
+          <a:p>
+            <a:pPr>
+              <a:lnSpc>
+                <a:spcPct val="80000"/>
+              </a:lnSpc>
+            </a:pPr>
+            <a:endParaRPr/>
+          </a:p>
+          <a:p>
+            <a:pPr>
+              <a:lnSpc>
+                <a:spcPct val="80000"/>
+              </a:lnSpc>
+            </a:pPr>
+            <a:endParaRPr/>
+          </a:p>
+          <a:p>
+            <a:pPr>
+              <a:lnSpc>
+                <a:spcPct val="80000"/>
+              </a:lnSpc>
+            </a:pPr>
+            <a:endParaRPr/>
+          </a:p>
+          <a:p>
+            <a:pPr>
+              <a:lnSpc>
+                <a:spcPct val="80000"/>
+              </a:lnSpc>
+              <a:buSzPct val="25000"/>
+              <a:buFont typeface="Wingdings" charset="2"/>
+              <a:buChar char=""/>
+            </a:pPr>
+            <a:r>
+              <a:rPr lang="en-IE" sz="2800">
+                <a:latin typeface="Arial"/>
+                <a:ea typeface="宋体"/>
+              </a:rPr>
+              <a:t>What is software copyright?</a:t>
+            </a:r>
+            <a:endParaRPr/>
+          </a:p>
+          <a:p>
+            <a:pPr>
+              <a:lnSpc>
+                <a:spcPct val="80000"/>
+              </a:lnSpc>
+            </a:pPr>
+            <a:endParaRPr/>
+          </a:p>
+          <a:p>
+            <a:pPr>
+              <a:lnSpc>
+                <a:spcPct val="80000"/>
+              </a:lnSpc>
+            </a:pPr>
+            <a:r>
+              <a:rPr lang="en-IE" sz="2800">
+                <a:latin typeface="Arial"/>
+                <a:ea typeface="宋体"/>
+              </a:rPr>
+              <a:t>    </a:t>
+            </a:r>
+            <a:r>
+              <a:rPr lang="en-IE" sz="2800">
+                <a:latin typeface="Arial"/>
+                <a:ea typeface="宋体"/>
+              </a:rPr>
+              <a:t>1. all the program code itself</a:t>
+            </a:r>
+            <a:endParaRPr/>
+          </a:p>
+          <a:p>
+            <a:pPr>
+              <a:lnSpc>
+                <a:spcPct val="80000"/>
+              </a:lnSpc>
+            </a:pPr>
+            <a:endParaRPr/>
+          </a:p>
+          <a:p>
+            <a:pPr>
+              <a:lnSpc>
+                <a:spcPct val="80000"/>
+              </a:lnSpc>
+            </a:pPr>
+            <a:r>
+              <a:rPr lang="en-IE" sz="2800">
+                <a:latin typeface="Arial"/>
+                <a:ea typeface="宋体"/>
+              </a:rPr>
+              <a:t>    </a:t>
+            </a:r>
+            <a:r>
+              <a:rPr lang="en-IE" sz="2800">
+                <a:latin typeface="Arial"/>
+                <a:ea typeface="宋体"/>
+              </a:rPr>
+              <a:t>2. documents that used to describe the contents, </a:t>
+            </a:r>
+            <a:endParaRPr/>
+          </a:p>
+          <a:p>
+            <a:pPr>
+              <a:lnSpc>
+                <a:spcPct val="80000"/>
+              </a:lnSpc>
+            </a:pPr>
+            <a:r>
+              <a:rPr lang="en-IE" sz="2800">
+                <a:latin typeface="Arial"/>
+                <a:ea typeface="宋体"/>
+              </a:rPr>
+              <a:t>        </a:t>
+            </a:r>
+            <a:r>
+              <a:rPr lang="en-IE" sz="2800">
+                <a:latin typeface="Arial"/>
+                <a:ea typeface="宋体"/>
+              </a:rPr>
+              <a:t>design, testing results, etc. of a program.</a:t>
+            </a:r>
+            <a:endParaRPr/>
+          </a:p>
+          <a:p>
+            <a:pPr>
+              <a:lnSpc>
+                <a:spcPct val="80000"/>
+              </a:lnSpc>
+            </a:pPr>
+            <a:r>
+              <a:rPr lang="en-IE" sz="2800">
+                <a:latin typeface="Arial"/>
+                <a:ea typeface="宋体"/>
+              </a:rPr>
+              <a:t>    </a:t>
+            </a:r>
+            <a:endParaRPr/>
+          </a:p>
+        </p:txBody>
+      </p:sp>
+      <p:pic>
+        <p:nvPicPr>
+          <p:cNvPr id="134" name="" descr=""/>
+          <p:cNvPicPr/>
+          <p:nvPr/>
+        </p:nvPicPr>
+        <p:blipFill>
+          <a:blip r:embed="rId1"/>
+          <a:stretch>
+            <a:fillRect/>
+          </a:stretch>
+        </p:blipFill>
+        <p:spPr>
+          <a:xfrm>
+            <a:off x="5905800" y="2123640"/>
+            <a:ext cx="3244680" cy="2302920"/>
+          </a:xfrm>
+          <a:prstGeom prst="rect">
+            <a:avLst/>
+          </a:prstGeom>
+          <a:ln>
+            <a:noFill/>
+          </a:ln>
+        </p:spPr>
+      </p:pic>
     </p:spTree>
   </p:cSld>
   <p:timing>

</xml_diff>